<commit_message>
! finishing the presentation
</commit_message>
<xml_diff>
--- a/Upravljanje koračnim motorom korištenjem myRio upravljačke platforme.pptx
+++ b/Upravljanje koračnim motorom korištenjem myRio upravljačke platforme.pptx
@@ -20,6 +20,13 @@
     <p:sldId id="268" r:id="rId14"/>
     <p:sldId id="269" r:id="rId15"/>
     <p:sldId id="270" r:id="rId16"/>
+    <p:sldId id="271" r:id="rId17"/>
+    <p:sldId id="272" r:id="rId18"/>
+    <p:sldId id="273" r:id="rId19"/>
+    <p:sldId id="274" r:id="rId20"/>
+    <p:sldId id="275" r:id="rId21"/>
+    <p:sldId id="276" r:id="rId22"/>
+    <p:sldId id="277" r:id="rId23"/>
   </p:sldIdLst>
   <p:sldSz cx="12192000" cy="6858000"/>
   <p:notesSz cx="6858000" cy="9144000"/>
@@ -118,6 +125,11 @@
       </a:defRPr>
     </a:lvl9pPr>
   </p:defaultTextStyle>
+  <p:extLst>
+    <p:ext uri="{EFAFB233-063F-42B5-8137-9DF3F51BA10A}">
+      <p15:sldGuideLst xmlns:p15="http://schemas.microsoft.com/office/powerpoint/2012/main"/>
+    </p:ext>
+  </p:extLst>
 </p:presentation>
 </file>
 
@@ -4010,10 +4022,16 @@
           <a:lstStyle/>
           <a:p>
             <a:r>
-              <a:rPr lang="hr-HR" dirty="0" smtClean="0"/>
+              <a:rPr lang="hr-HR" dirty="0" smtClean="0">
+                <a:latin typeface="Arial" panose="020B0604020202020204" pitchFamily="34" charset="0"/>
+                <a:cs typeface="Arial" panose="020B0604020202020204" pitchFamily="34" charset="0"/>
+              </a:rPr>
               <a:t>3. MyRIO platforma</a:t>
             </a:r>
-            <a:endParaRPr lang="hr-HR" dirty="0"/>
+            <a:endParaRPr lang="hr-HR" dirty="0">
+              <a:latin typeface="Arial" panose="020B0604020202020204" pitchFamily="34" charset="0"/>
+              <a:cs typeface="Arial" panose="020B0604020202020204" pitchFamily="34" charset="0"/>
+            </a:endParaRPr>
           </a:p>
         </p:txBody>
       </p:sp>
@@ -4046,6 +4064,13 @@
   <p:clrMapOvr>
     <a:masterClrMapping/>
   </p:clrMapOvr>
+  <p:timing>
+    <p:tnLst>
+      <p:par>
+        <p:cTn id="1" dur="indefinite" restart="never" nodeType="tmRoot"/>
+      </p:par>
+    </p:tnLst>
+  </p:timing>
 </p:sld>
 </file>
 
@@ -4085,8 +4110,8 @@
           </a:p>
         </p:txBody>
       </p:sp>
-      <mc:AlternateContent xmlns:mc="http://schemas.openxmlformats.org/markup-compatibility/2006">
-        <mc:Choice xmlns:a14="http://schemas.microsoft.com/office/drawing/2010/main" Requires="a14">
+      <mc:AlternateContent xmlns:mc="http://schemas.openxmlformats.org/markup-compatibility/2006" xmlns:a14="http://schemas.microsoft.com/office/drawing/2010/main">
+        <mc:Choice Requires="a14">
           <p:sp>
             <p:nvSpPr>
               <p:cNvPr id="3" name="Content Placeholder 2"/>
@@ -4248,7 +4273,7 @@
             </p:txBody>
           </p:sp>
         </mc:Choice>
-        <mc:Fallback>
+        <mc:Fallback xmlns="">
           <p:sp>
             <p:nvSpPr>
               <p:cNvPr id="3" name="Content Placeholder 2"/>
@@ -4292,6 +4317,13 @@
   <p:clrMapOvr>
     <a:masterClrMapping/>
   </p:clrMapOvr>
+  <p:timing>
+    <p:tnLst>
+      <p:par>
+        <p:cTn id="1" dur="indefinite" restart="never" nodeType="tmRoot"/>
+      </p:par>
+    </p:tnLst>
+  </p:timing>
 </p:sld>
 </file>
 
@@ -4416,6 +4448,13 @@
   <p:clrMapOvr>
     <a:masterClrMapping/>
   </p:clrMapOvr>
+  <p:timing>
+    <p:tnLst>
+      <p:par>
+        <p:cTn id="1" dur="indefinite" restart="never" nodeType="tmRoot"/>
+      </p:par>
+    </p:tnLst>
+  </p:timing>
 </p:sld>
 </file>
 
@@ -4452,10 +4491,16 @@
           <a:lstStyle/>
           <a:p>
             <a:r>
-              <a:rPr lang="hr-HR" dirty="0" smtClean="0"/>
+              <a:rPr lang="hr-HR" dirty="0" smtClean="0">
+                <a:latin typeface="Arial" panose="020B0604020202020204" pitchFamily="34" charset="0"/>
+                <a:cs typeface="Arial" panose="020B0604020202020204" pitchFamily="34" charset="0"/>
+              </a:rPr>
               <a:t>4. Rješenje upravljanja motorom</a:t>
             </a:r>
-            <a:endParaRPr lang="hr-HR" dirty="0"/>
+            <a:endParaRPr lang="hr-HR" dirty="0">
+              <a:latin typeface="Arial" panose="020B0604020202020204" pitchFamily="34" charset="0"/>
+              <a:cs typeface="Arial" panose="020B0604020202020204" pitchFamily="34" charset="0"/>
+            </a:endParaRPr>
           </a:p>
         </p:txBody>
       </p:sp>
@@ -4488,6 +4533,13 @@
   <p:clrMapOvr>
     <a:masterClrMapping/>
   </p:clrMapOvr>
+  <p:timing>
+    <p:tnLst>
+      <p:par>
+        <p:cTn id="1" dur="indefinite" restart="never" nodeType="tmRoot"/>
+      </p:par>
+    </p:tnLst>
+  </p:timing>
 </p:sld>
 </file>
 
@@ -4536,7 +4588,7 @@
         <p:spPr>
           <a:xfrm>
             <a:off x="4420998" y="5192785"/>
-            <a:ext cx="2047355" cy="307777"/>
+            <a:ext cx="2207656" cy="307777"/>
           </a:xfrm>
           <a:prstGeom prst="rect">
             <a:avLst/>
@@ -4554,7 +4606,21 @@
                 <a:latin typeface="Arial" panose="020B0604020202020204" pitchFamily="34" charset="0"/>
                 <a:cs typeface="Arial" panose="020B0604020202020204" pitchFamily="34" charset="0"/>
               </a:rPr>
-              <a:t>Slika 2 Grafičko sučelje</a:t>
+              <a:t>Slika 2 </a:t>
+            </a:r>
+            <a:r>
+              <a:rPr lang="en-US" sz="1400" dirty="0" err="1" smtClean="0">
+                <a:latin typeface="Arial" panose="020B0604020202020204" pitchFamily="34" charset="0"/>
+                <a:cs typeface="Arial" panose="020B0604020202020204" pitchFamily="34" charset="0"/>
+              </a:rPr>
+              <a:t>Korisni</a:t>
+            </a:r>
+            <a:r>
+              <a:rPr lang="hr-HR" sz="1400" dirty="0" smtClean="0">
+                <a:latin typeface="Arial" panose="020B0604020202020204" pitchFamily="34" charset="0"/>
+                <a:cs typeface="Arial" panose="020B0604020202020204" pitchFamily="34" charset="0"/>
+              </a:rPr>
+              <a:t>čko sučelje</a:t>
             </a:r>
             <a:endParaRPr lang="hr-HR" sz="1400" dirty="0">
               <a:latin typeface="Arial" panose="020B0604020202020204" pitchFamily="34" charset="0"/>
@@ -4602,6 +4668,13 @@
   <p:clrMapOvr>
     <a:masterClrMapping/>
   </p:clrMapOvr>
+  <p:timing>
+    <p:tnLst>
+      <p:par>
+        <p:cTn id="1" dur="indefinite" restart="never" nodeType="tmRoot"/>
+      </p:par>
+    </p:tnLst>
+  </p:timing>
 </p:sld>
 </file>
 
@@ -4641,29 +4714,1323 @@
           </a:p>
         </p:txBody>
       </p:sp>
-      <p:sp>
-        <p:nvSpPr>
-          <p:cNvPr id="3" name="Content Placeholder 2"/>
-          <p:cNvSpPr>
-            <a:spLocks noGrp="1"/>
-          </p:cNvSpPr>
+      <p:pic>
+        <p:nvPicPr>
+          <p:cNvPr id="6" name="Content Placeholder 5"/>
+          <p:cNvPicPr>
+            <a:picLocks noGrp="1" noChangeAspect="1"/>
+          </p:cNvPicPr>
           <p:nvPr>
             <p:ph idx="1"/>
           </p:nvPr>
-        </p:nvSpPr>
-        <p:spPr/>
-        <p:txBody>
-          <a:bodyPr/>
-          <a:lstStyle/>
-          <a:p>
-            <a:endParaRPr lang="hr-HR"/>
+        </p:nvPicPr>
+        <p:blipFill>
+          <a:blip r:embed="rId2">
+            <a:extLst>
+              <a:ext uri="{28A0092B-C50C-407E-A947-70E740481C1C}">
+                <a14:useLocalDpi xmlns:a14="http://schemas.microsoft.com/office/drawing/2010/main" val="0"/>
+              </a:ext>
+            </a:extLst>
+          </a:blip>
+          <a:stretch>
+            <a:fillRect/>
+          </a:stretch>
+        </p:blipFill>
+        <p:spPr>
+          <a:xfrm>
+            <a:off x="1097280" y="163557"/>
+            <a:ext cx="10058399" cy="4920733"/>
+          </a:xfrm>
+        </p:spPr>
+      </p:pic>
+      <p:sp>
+        <p:nvSpPr>
+          <p:cNvPr id="7" name="TextBox 6"/>
+          <p:cNvSpPr txBox="1"/>
+          <p:nvPr/>
+        </p:nvSpPr>
+        <p:spPr>
+          <a:xfrm>
+            <a:off x="4158421" y="5276675"/>
+            <a:ext cx="3936115" cy="307777"/>
+          </a:xfrm>
+          <a:prstGeom prst="rect">
+            <a:avLst/>
+          </a:prstGeom>
+          <a:noFill/>
+        </p:spPr>
+        <p:txBody>
+          <a:bodyPr wrap="square" rtlCol="0">
+            <a:spAutoFit/>
+          </a:bodyPr>
+          <a:lstStyle/>
+          <a:p>
+            <a:r>
+              <a:rPr lang="hr-HR" sz="1400" dirty="0" smtClean="0">
+                <a:latin typeface="Arial" panose="020B0604020202020204" pitchFamily="34" charset="0"/>
+                <a:cs typeface="Arial" panose="020B0604020202020204" pitchFamily="34" charset="0"/>
+              </a:rPr>
+              <a:t>Slika 3 Prikaz odnosa kliznika i digitalnih izlaza</a:t>
+            </a:r>
+            <a:endParaRPr lang="hr-HR" sz="1400" dirty="0">
+              <a:latin typeface="Arial" panose="020B0604020202020204" pitchFamily="34" charset="0"/>
+              <a:cs typeface="Arial" panose="020B0604020202020204" pitchFamily="34" charset="0"/>
+            </a:endParaRPr>
           </a:p>
         </p:txBody>
       </p:sp>
     </p:spTree>
     <p:extLst>
       <p:ext uri="{BB962C8B-B14F-4D97-AF65-F5344CB8AC3E}">
-        <p14:creationId xmlns:p14="http://schemas.microsoft.com/office/powerpoint/2010/main" val="162370287"/>
+        <p14:creationId xmlns:p14="http://schemas.microsoft.com/office/powerpoint/2010/main" val="1283583172"/>
+      </p:ext>
+    </p:extLst>
+  </p:cSld>
+  <p:clrMapOvr>
+    <a:masterClrMapping/>
+  </p:clrMapOvr>
+  <p:timing>
+    <p:tnLst>
+      <p:par>
+        <p:cTn id="1" dur="indefinite" restart="never" nodeType="tmRoot"/>
+      </p:par>
+    </p:tnLst>
+  </p:timing>
+</p:sld>
+</file>
+
+<file path=ppt/slides/slide16.xml><?xml version="1.0" encoding="utf-8"?>
+<p:sld xmlns:a="http://schemas.openxmlformats.org/drawingml/2006/main" xmlns:r="http://schemas.openxmlformats.org/officeDocument/2006/relationships" xmlns:p="http://schemas.openxmlformats.org/presentationml/2006/main">
+  <p:cSld>
+    <p:spTree>
+      <p:nvGrpSpPr>
+        <p:cNvPr id="1" name=""/>
+        <p:cNvGrpSpPr/>
+        <p:nvPr/>
+      </p:nvGrpSpPr>
+      <p:grpSpPr>
+        <a:xfrm>
+          <a:off x="0" y="0"/>
+          <a:ext cx="0" cy="0"/>
+          <a:chOff x="0" y="0"/>
+          <a:chExt cx="0" cy="0"/>
+        </a:xfrm>
+      </p:grpSpPr>
+      <p:sp>
+        <p:nvSpPr>
+          <p:cNvPr id="2" name="Title 1"/>
+          <p:cNvSpPr>
+            <a:spLocks noGrp="1"/>
+          </p:cNvSpPr>
+          <p:nvPr>
+            <p:ph type="title"/>
+          </p:nvPr>
+        </p:nvSpPr>
+        <p:spPr/>
+        <p:txBody>
+          <a:bodyPr/>
+          <a:lstStyle/>
+          <a:p>
+            <a:endParaRPr lang="hr-HR"/>
+          </a:p>
+        </p:txBody>
+      </p:sp>
+      <mc:AlternateContent xmlns:mc="http://schemas.openxmlformats.org/markup-compatibility/2006" xmlns:a14="http://schemas.microsoft.com/office/drawing/2010/main">
+        <mc:Choice Requires="a14">
+          <p:sp>
+            <p:nvSpPr>
+              <p:cNvPr id="3" name="Content Placeholder 2"/>
+              <p:cNvSpPr>
+                <a:spLocks noGrp="1"/>
+              </p:cNvSpPr>
+              <p:nvPr>
+                <p:ph idx="1"/>
+              </p:nvPr>
+            </p:nvSpPr>
+            <p:spPr/>
+            <p:txBody>
+              <a:bodyPr>
+                <a:normAutofit/>
+              </a:bodyPr>
+              <a:lstStyle/>
+              <a:p>
+                <a:r>
+                  <a:rPr lang="hr-HR" sz="3400" dirty="0" smtClean="0">
+                    <a:latin typeface="Arial" panose="020B0604020202020204" pitchFamily="34" charset="0"/>
+                    <a:cs typeface="Arial" panose="020B0604020202020204" pitchFamily="34" charset="0"/>
+                  </a:rPr>
+                  <a:t>Eksponencijalni filter zaglađivanja</a:t>
+                </a:r>
+              </a:p>
+              <a:p>
+                <a:pPr lvl="1"/>
+                <a:endParaRPr lang="hr-HR" sz="3200" dirty="0" smtClean="0">
+                  <a:latin typeface="Arial" panose="020B0604020202020204" pitchFamily="34" charset="0"/>
+                  <a:cs typeface="Arial" panose="020B0604020202020204" pitchFamily="34" charset="0"/>
+                </a:endParaRPr>
+              </a:p>
+              <a:p>
+                <a:pPr lvl="2"/>
+                <a:r>
+                  <a:rPr lang="hr-HR" sz="2400" dirty="0" smtClean="0">
+                    <a:latin typeface="Arial" panose="020B0604020202020204" pitchFamily="34" charset="0"/>
+                    <a:cs typeface="Arial" panose="020B0604020202020204" pitchFamily="34" charset="0"/>
+                  </a:rPr>
+                  <a:t>Rule of thumb</a:t>
+                </a:r>
+              </a:p>
+              <a:p>
+                <a:pPr lvl="2"/>
+                <a:endParaRPr lang="hr-HR" sz="2400" dirty="0" smtClean="0">
+                  <a:latin typeface="Arial" panose="020B0604020202020204" pitchFamily="34" charset="0"/>
+                  <a:cs typeface="Arial" panose="020B0604020202020204" pitchFamily="34" charset="0"/>
+                </a:endParaRPr>
+              </a:p>
+              <a:p>
+                <a:pPr lvl="2"/>
+                <a:r>
+                  <a:rPr lang="hr-HR" sz="2400" dirty="0" smtClean="0">
+                    <a:latin typeface="Arial" panose="020B0604020202020204" pitchFamily="34" charset="0"/>
+                    <a:cs typeface="Arial" panose="020B0604020202020204" pitchFamily="34" charset="0"/>
+                  </a:rPr>
+                  <a:t>Eksponencijalna prozorska funkcija</a:t>
+                </a:r>
+              </a:p>
+              <a:p>
+                <a:pPr lvl="2"/>
+                <a:endParaRPr lang="hr-HR" sz="2400" dirty="0" smtClean="0">
+                  <a:latin typeface="Arial" panose="020B0604020202020204" pitchFamily="34" charset="0"/>
+                  <a:cs typeface="Arial" panose="020B0604020202020204" pitchFamily="34" charset="0"/>
+                </a:endParaRPr>
+              </a:p>
+              <a:p>
+                <a:pPr marL="566928" lvl="3" indent="0">
+                  <a:buNone/>
+                </a:pPr>
+                <a14:m>
+                  <m:oMathPara xmlns:m="http://schemas.openxmlformats.org/officeDocument/2006/math">
+                    <m:oMathParaPr>
+                      <m:jc m:val="centerGroup"/>
+                    </m:oMathParaPr>
+                    <m:oMath xmlns:m="http://schemas.openxmlformats.org/officeDocument/2006/math">
+                      <m:sSub>
+                        <m:sSubPr>
+                          <m:ctrlPr>
+                            <a:rPr lang="hr-HR" sz="2400" b="0" i="1" smtClean="0">
+                              <a:latin typeface="Cambria Math" panose="02040503050406030204" pitchFamily="18" charset="0"/>
+                              <a:cs typeface="Arial" panose="020B0604020202020204" pitchFamily="34" charset="0"/>
+                            </a:rPr>
+                          </m:ctrlPr>
+                        </m:sSubPr>
+                        <m:e>
+                          <m:r>
+                            <a:rPr lang="hr-HR" sz="2400" b="0" i="1" smtClean="0">
+                              <a:latin typeface="Cambria Math" panose="02040503050406030204" pitchFamily="18" charset="0"/>
+                              <a:cs typeface="Arial" panose="020B0604020202020204" pitchFamily="34" charset="0"/>
+                            </a:rPr>
+                            <m:t>𝑠</m:t>
+                          </m:r>
+                        </m:e>
+                        <m:sub>
+                          <m:r>
+                            <a:rPr lang="hr-HR" sz="2400" b="0" i="1" smtClean="0">
+                              <a:latin typeface="Cambria Math" panose="02040503050406030204" pitchFamily="18" charset="0"/>
+                              <a:cs typeface="Arial" panose="020B0604020202020204" pitchFamily="34" charset="0"/>
+                            </a:rPr>
+                            <m:t>𝑡</m:t>
+                          </m:r>
+                        </m:sub>
+                      </m:sSub>
+                      <m:r>
+                        <a:rPr lang="hr-HR" sz="2400" b="0" i="1" smtClean="0">
+                          <a:latin typeface="Cambria Math" panose="02040503050406030204" pitchFamily="18" charset="0"/>
+                          <a:cs typeface="Arial" panose="020B0604020202020204" pitchFamily="34" charset="0"/>
+                        </a:rPr>
+                        <m:t>=</m:t>
+                      </m:r>
+                      <m:r>
+                        <a:rPr lang="hr-HR" sz="2400" b="0" i="1" smtClean="0">
+                          <a:latin typeface="Cambria Math" panose="02040503050406030204" pitchFamily="18" charset="0"/>
+                          <a:cs typeface="Arial" panose="020B0604020202020204" pitchFamily="34" charset="0"/>
+                        </a:rPr>
+                        <m:t>𝛼</m:t>
+                      </m:r>
+                      <m:sSub>
+                        <m:sSubPr>
+                          <m:ctrlPr>
+                            <a:rPr lang="hr-HR" sz="2400" b="0" i="1" smtClean="0">
+                              <a:latin typeface="Cambria Math" panose="02040503050406030204" pitchFamily="18" charset="0"/>
+                              <a:cs typeface="Arial" panose="020B0604020202020204" pitchFamily="34" charset="0"/>
+                            </a:rPr>
+                          </m:ctrlPr>
+                        </m:sSubPr>
+                        <m:e>
+                          <m:r>
+                            <a:rPr lang="hr-HR" sz="2400" b="0" i="1" smtClean="0">
+                              <a:latin typeface="Cambria Math" panose="02040503050406030204" pitchFamily="18" charset="0"/>
+                              <a:cs typeface="Arial" panose="020B0604020202020204" pitchFamily="34" charset="0"/>
+                            </a:rPr>
+                            <m:t>𝑥</m:t>
+                          </m:r>
+                        </m:e>
+                        <m:sub>
+                          <m:r>
+                            <a:rPr lang="hr-HR" sz="2400" b="0" i="1" smtClean="0">
+                              <a:latin typeface="Cambria Math" panose="02040503050406030204" pitchFamily="18" charset="0"/>
+                              <a:cs typeface="Arial" panose="020B0604020202020204" pitchFamily="34" charset="0"/>
+                            </a:rPr>
+                            <m:t>𝑡</m:t>
+                          </m:r>
+                        </m:sub>
+                      </m:sSub>
+                      <m:r>
+                        <a:rPr lang="hr-HR" sz="2400" b="0" i="1" smtClean="0">
+                          <a:latin typeface="Cambria Math" panose="02040503050406030204" pitchFamily="18" charset="0"/>
+                          <a:cs typeface="Arial" panose="020B0604020202020204" pitchFamily="34" charset="0"/>
+                        </a:rPr>
+                        <m:t>+</m:t>
+                      </m:r>
+                      <m:d>
+                        <m:dPr>
+                          <m:ctrlPr>
+                            <a:rPr lang="hr-HR" sz="2400" b="0" i="1" smtClean="0">
+                              <a:latin typeface="Cambria Math" panose="02040503050406030204" pitchFamily="18" charset="0"/>
+                              <a:cs typeface="Arial" panose="020B0604020202020204" pitchFamily="34" charset="0"/>
+                            </a:rPr>
+                          </m:ctrlPr>
+                        </m:dPr>
+                        <m:e>
+                          <m:r>
+                            <a:rPr lang="hr-HR" sz="2400" b="0" i="1" smtClean="0">
+                              <a:latin typeface="Cambria Math" panose="02040503050406030204" pitchFamily="18" charset="0"/>
+                              <a:cs typeface="Arial" panose="020B0604020202020204" pitchFamily="34" charset="0"/>
+                            </a:rPr>
+                            <m:t>1−</m:t>
+                          </m:r>
+                          <m:r>
+                            <a:rPr lang="hr-HR" sz="2400" b="0" i="1" smtClean="0">
+                              <a:latin typeface="Cambria Math" panose="02040503050406030204" pitchFamily="18" charset="0"/>
+                              <a:cs typeface="Arial" panose="020B0604020202020204" pitchFamily="34" charset="0"/>
+                            </a:rPr>
+                            <m:t>𝛼</m:t>
+                          </m:r>
+                        </m:e>
+                      </m:d>
+                      <m:sSub>
+                        <m:sSubPr>
+                          <m:ctrlPr>
+                            <a:rPr lang="hr-HR" sz="2400" b="0" i="1" smtClean="0">
+                              <a:latin typeface="Cambria Math" panose="02040503050406030204" pitchFamily="18" charset="0"/>
+                              <a:cs typeface="Arial" panose="020B0604020202020204" pitchFamily="34" charset="0"/>
+                            </a:rPr>
+                          </m:ctrlPr>
+                        </m:sSubPr>
+                        <m:e>
+                          <m:r>
+                            <a:rPr lang="hr-HR" sz="2400" b="0" i="1" smtClean="0">
+                              <a:latin typeface="Cambria Math" panose="02040503050406030204" pitchFamily="18" charset="0"/>
+                              <a:cs typeface="Arial" panose="020B0604020202020204" pitchFamily="34" charset="0"/>
+                            </a:rPr>
+                            <m:t>𝑠</m:t>
+                          </m:r>
+                        </m:e>
+                        <m:sub>
+                          <m:r>
+                            <a:rPr lang="hr-HR" sz="2400" b="0" i="1" smtClean="0">
+                              <a:latin typeface="Cambria Math" panose="02040503050406030204" pitchFamily="18" charset="0"/>
+                              <a:cs typeface="Arial" panose="020B0604020202020204" pitchFamily="34" charset="0"/>
+                            </a:rPr>
+                            <m:t>𝑡</m:t>
+                          </m:r>
+                          <m:r>
+                            <a:rPr lang="hr-HR" sz="2400" b="0" i="1" smtClean="0">
+                              <a:latin typeface="Cambria Math" panose="02040503050406030204" pitchFamily="18" charset="0"/>
+                              <a:cs typeface="Arial" panose="020B0604020202020204" pitchFamily="34" charset="0"/>
+                            </a:rPr>
+                            <m:t>−1</m:t>
+                          </m:r>
+                        </m:sub>
+                      </m:sSub>
+                      <m:r>
+                        <a:rPr lang="hr-HR" sz="2400" b="0" i="1" smtClean="0">
+                          <a:latin typeface="Cambria Math" panose="02040503050406030204" pitchFamily="18" charset="0"/>
+                          <a:cs typeface="Arial" panose="020B0604020202020204" pitchFamily="34" charset="0"/>
+                        </a:rPr>
+                        <m:t>=</m:t>
+                      </m:r>
+                      <m:sSub>
+                        <m:sSubPr>
+                          <m:ctrlPr>
+                            <a:rPr lang="hr-HR" sz="2400" b="0" i="1" smtClean="0">
+                              <a:latin typeface="Cambria Math" panose="02040503050406030204" pitchFamily="18" charset="0"/>
+                              <a:cs typeface="Arial" panose="020B0604020202020204" pitchFamily="34" charset="0"/>
+                            </a:rPr>
+                          </m:ctrlPr>
+                        </m:sSubPr>
+                        <m:e>
+                          <m:r>
+                            <a:rPr lang="hr-HR" sz="2400" b="0" i="1" smtClean="0">
+                              <a:latin typeface="Cambria Math" panose="02040503050406030204" pitchFamily="18" charset="0"/>
+                              <a:cs typeface="Arial" panose="020B0604020202020204" pitchFamily="34" charset="0"/>
+                            </a:rPr>
+                            <m:t>𝑠</m:t>
+                          </m:r>
+                        </m:e>
+                        <m:sub>
+                          <m:r>
+                            <a:rPr lang="hr-HR" sz="2400" b="0" i="1" smtClean="0">
+                              <a:latin typeface="Cambria Math" panose="02040503050406030204" pitchFamily="18" charset="0"/>
+                              <a:cs typeface="Arial" panose="020B0604020202020204" pitchFamily="34" charset="0"/>
+                            </a:rPr>
+                            <m:t>𝑡</m:t>
+                          </m:r>
+                          <m:r>
+                            <a:rPr lang="hr-HR" sz="2400" b="0" i="1" smtClean="0">
+                              <a:latin typeface="Cambria Math" panose="02040503050406030204" pitchFamily="18" charset="0"/>
+                              <a:cs typeface="Arial" panose="020B0604020202020204" pitchFamily="34" charset="0"/>
+                            </a:rPr>
+                            <m:t>−1</m:t>
+                          </m:r>
+                        </m:sub>
+                      </m:sSub>
+                      <m:r>
+                        <a:rPr lang="hr-HR" sz="2400" b="0" i="1" smtClean="0">
+                          <a:latin typeface="Cambria Math" panose="02040503050406030204" pitchFamily="18" charset="0"/>
+                          <a:cs typeface="Arial" panose="020B0604020202020204" pitchFamily="34" charset="0"/>
+                        </a:rPr>
+                        <m:t>+</m:t>
+                      </m:r>
+                      <m:r>
+                        <a:rPr lang="hr-HR" sz="2400" b="0" i="1" smtClean="0">
+                          <a:latin typeface="Cambria Math" panose="02040503050406030204" pitchFamily="18" charset="0"/>
+                          <a:cs typeface="Arial" panose="020B0604020202020204" pitchFamily="34" charset="0"/>
+                        </a:rPr>
+                        <m:t>𝛼</m:t>
+                      </m:r>
+                      <m:r>
+                        <a:rPr lang="hr-HR" sz="2400" b="0" i="1" smtClean="0">
+                          <a:latin typeface="Cambria Math" panose="02040503050406030204" pitchFamily="18" charset="0"/>
+                          <a:cs typeface="Arial" panose="020B0604020202020204" pitchFamily="34" charset="0"/>
+                        </a:rPr>
+                        <m:t>(</m:t>
+                      </m:r>
+                      <m:sSub>
+                        <m:sSubPr>
+                          <m:ctrlPr>
+                            <a:rPr lang="hr-HR" sz="2400" b="0" i="1" smtClean="0">
+                              <a:latin typeface="Cambria Math" panose="02040503050406030204" pitchFamily="18" charset="0"/>
+                              <a:cs typeface="Arial" panose="020B0604020202020204" pitchFamily="34" charset="0"/>
+                            </a:rPr>
+                          </m:ctrlPr>
+                        </m:sSubPr>
+                        <m:e>
+                          <m:r>
+                            <a:rPr lang="hr-HR" sz="2400" b="0" i="1" smtClean="0">
+                              <a:latin typeface="Cambria Math" panose="02040503050406030204" pitchFamily="18" charset="0"/>
+                              <a:cs typeface="Arial" panose="020B0604020202020204" pitchFamily="34" charset="0"/>
+                            </a:rPr>
+                            <m:t>𝑥</m:t>
+                          </m:r>
+                        </m:e>
+                        <m:sub>
+                          <m:r>
+                            <a:rPr lang="hr-HR" sz="2400" b="0" i="1" smtClean="0">
+                              <a:latin typeface="Cambria Math" panose="02040503050406030204" pitchFamily="18" charset="0"/>
+                              <a:cs typeface="Arial" panose="020B0604020202020204" pitchFamily="34" charset="0"/>
+                            </a:rPr>
+                            <m:t>𝑡</m:t>
+                          </m:r>
+                        </m:sub>
+                      </m:sSub>
+                      <m:r>
+                        <a:rPr lang="hr-HR" sz="2400" b="0" i="1" smtClean="0">
+                          <a:latin typeface="Cambria Math" panose="02040503050406030204" pitchFamily="18" charset="0"/>
+                          <a:cs typeface="Arial" panose="020B0604020202020204" pitchFamily="34" charset="0"/>
+                        </a:rPr>
+                        <m:t>−</m:t>
+                      </m:r>
+                      <m:sSub>
+                        <m:sSubPr>
+                          <m:ctrlPr>
+                            <a:rPr lang="hr-HR" sz="2400" b="0" i="1" smtClean="0">
+                              <a:latin typeface="Cambria Math" panose="02040503050406030204" pitchFamily="18" charset="0"/>
+                              <a:cs typeface="Arial" panose="020B0604020202020204" pitchFamily="34" charset="0"/>
+                            </a:rPr>
+                          </m:ctrlPr>
+                        </m:sSubPr>
+                        <m:e>
+                          <m:r>
+                            <a:rPr lang="hr-HR" sz="2400" b="0" i="1" smtClean="0">
+                              <a:latin typeface="Cambria Math" panose="02040503050406030204" pitchFamily="18" charset="0"/>
+                              <a:cs typeface="Arial" panose="020B0604020202020204" pitchFamily="34" charset="0"/>
+                            </a:rPr>
+                            <m:t>𝑠</m:t>
+                          </m:r>
+                        </m:e>
+                        <m:sub>
+                          <m:r>
+                            <a:rPr lang="hr-HR" sz="2400" b="0" i="1" smtClean="0">
+                              <a:latin typeface="Cambria Math" panose="02040503050406030204" pitchFamily="18" charset="0"/>
+                              <a:cs typeface="Arial" panose="020B0604020202020204" pitchFamily="34" charset="0"/>
+                            </a:rPr>
+                            <m:t>𝑡</m:t>
+                          </m:r>
+                          <m:r>
+                            <a:rPr lang="hr-HR" sz="2400" b="0" i="1" smtClean="0">
+                              <a:latin typeface="Cambria Math" panose="02040503050406030204" pitchFamily="18" charset="0"/>
+                              <a:cs typeface="Arial" panose="020B0604020202020204" pitchFamily="34" charset="0"/>
+                            </a:rPr>
+                            <m:t>−1</m:t>
+                          </m:r>
+                        </m:sub>
+                      </m:sSub>
+                      <m:r>
+                        <a:rPr lang="hr-HR" sz="2400" b="0" i="1" smtClean="0">
+                          <a:latin typeface="Cambria Math" panose="02040503050406030204" pitchFamily="18" charset="0"/>
+                          <a:cs typeface="Arial" panose="020B0604020202020204" pitchFamily="34" charset="0"/>
+                        </a:rPr>
+                        <m:t>)</m:t>
+                      </m:r>
+                    </m:oMath>
+                  </m:oMathPara>
+                </a14:m>
+                <a:endParaRPr lang="hr-HR" sz="2400" dirty="0" smtClean="0">
+                  <a:latin typeface="Arial" panose="020B0604020202020204" pitchFamily="34" charset="0"/>
+                  <a:cs typeface="Arial" panose="020B0604020202020204" pitchFamily="34" charset="0"/>
+                </a:endParaRPr>
+              </a:p>
+              <a:p>
+                <a:pPr lvl="2"/>
+                <a:endParaRPr lang="hr-HR" sz="2400" dirty="0" smtClean="0">
+                  <a:latin typeface="Arial" panose="020B0604020202020204" pitchFamily="34" charset="0"/>
+                  <a:cs typeface="Arial" panose="020B0604020202020204" pitchFamily="34" charset="0"/>
+                </a:endParaRPr>
+              </a:p>
+            </p:txBody>
+          </p:sp>
+        </mc:Choice>
+        <mc:Fallback xmlns="">
+          <p:sp>
+            <p:nvSpPr>
+              <p:cNvPr id="3" name="Content Placeholder 2"/>
+              <p:cNvSpPr>
+                <a:spLocks noGrp="1" noRot="1" noChangeAspect="1" noMove="1" noResize="1" noEditPoints="1" noAdjustHandles="1" noChangeArrowheads="1" noChangeShapeType="1" noTextEdit="1"/>
+              </p:cNvSpPr>
+              <p:nvPr>
+                <p:ph idx="1"/>
+              </p:nvPr>
+            </p:nvSpPr>
+            <p:spPr>
+              <a:blipFill>
+                <a:blip r:embed="rId2"/>
+                <a:stretch>
+                  <a:fillRect l="-1394" t="-3485"/>
+                </a:stretch>
+              </a:blipFill>
+            </p:spPr>
+            <p:txBody>
+              <a:bodyPr/>
+              <a:lstStyle/>
+              <a:p>
+                <a:r>
+                  <a:rPr lang="hr-HR">
+                    <a:noFill/>
+                  </a:rPr>
+                  <a:t> </a:t>
+                </a:r>
+              </a:p>
+            </p:txBody>
+          </p:sp>
+        </mc:Fallback>
+      </mc:AlternateContent>
+    </p:spTree>
+    <p:extLst>
+      <p:ext uri="{BB962C8B-B14F-4D97-AF65-F5344CB8AC3E}">
+        <p14:creationId xmlns:p14="http://schemas.microsoft.com/office/powerpoint/2010/main" val="143001673"/>
+      </p:ext>
+    </p:extLst>
+  </p:cSld>
+  <p:clrMapOvr>
+    <a:masterClrMapping/>
+  </p:clrMapOvr>
+  <p:timing>
+    <p:tnLst>
+      <p:par>
+        <p:cTn id="1" dur="indefinite" restart="never" nodeType="tmRoot"/>
+      </p:par>
+    </p:tnLst>
+  </p:timing>
+</p:sld>
+</file>
+
+<file path=ppt/slides/slide17.xml><?xml version="1.0" encoding="utf-8"?>
+<p:sld xmlns:a="http://schemas.openxmlformats.org/drawingml/2006/main" xmlns:r="http://schemas.openxmlformats.org/officeDocument/2006/relationships" xmlns:p="http://schemas.openxmlformats.org/presentationml/2006/main">
+  <p:cSld>
+    <p:spTree>
+      <p:nvGrpSpPr>
+        <p:cNvPr id="1" name=""/>
+        <p:cNvGrpSpPr/>
+        <p:nvPr/>
+      </p:nvGrpSpPr>
+      <p:grpSpPr>
+        <a:xfrm>
+          <a:off x="0" y="0"/>
+          <a:ext cx="0" cy="0"/>
+          <a:chOff x="0" y="0"/>
+          <a:chExt cx="0" cy="0"/>
+        </a:xfrm>
+      </p:grpSpPr>
+      <p:sp>
+        <p:nvSpPr>
+          <p:cNvPr id="2" name="Title 1"/>
+          <p:cNvSpPr>
+            <a:spLocks noGrp="1"/>
+          </p:cNvSpPr>
+          <p:nvPr>
+            <p:ph type="title"/>
+          </p:nvPr>
+        </p:nvSpPr>
+        <p:spPr/>
+        <p:txBody>
+          <a:bodyPr/>
+          <a:lstStyle/>
+          <a:p>
+            <a:endParaRPr lang="hr-HR"/>
+          </a:p>
+        </p:txBody>
+      </p:sp>
+      <p:sp>
+        <p:nvSpPr>
+          <p:cNvPr id="3" name="Content Placeholder 2"/>
+          <p:cNvSpPr>
+            <a:spLocks noGrp="1"/>
+          </p:cNvSpPr>
+          <p:nvPr>
+            <p:ph idx="1"/>
+          </p:nvPr>
+        </p:nvSpPr>
+        <p:spPr/>
+        <p:txBody>
+          <a:bodyPr>
+            <a:normAutofit/>
+          </a:bodyPr>
+          <a:lstStyle/>
+          <a:p>
+            <a:r>
+              <a:rPr lang="hr-HR" sz="3600" dirty="0" smtClean="0">
+                <a:latin typeface="Arial" panose="020B0604020202020204" pitchFamily="34" charset="0"/>
+                <a:cs typeface="Arial" panose="020B0604020202020204" pitchFamily="34" charset="0"/>
+              </a:rPr>
+              <a:t>Ograničavač porasta signala</a:t>
+            </a:r>
+          </a:p>
+          <a:p>
+            <a:pPr lvl="2"/>
+            <a:r>
+              <a:rPr lang="hr-HR" sz="2400" dirty="0" smtClean="0">
+                <a:latin typeface="Arial" panose="020B0604020202020204" pitchFamily="34" charset="0"/>
+                <a:cs typeface="Arial" panose="020B0604020202020204" pitchFamily="34" charset="0"/>
+              </a:rPr>
+              <a:t>Drift: linearna → parabolična funkcija</a:t>
+            </a:r>
+          </a:p>
+          <a:p>
+            <a:pPr lvl="2"/>
+            <a:endParaRPr lang="hr-HR" sz="2400" dirty="0">
+              <a:latin typeface="Arial" panose="020B0604020202020204" pitchFamily="34" charset="0"/>
+              <a:cs typeface="Arial" panose="020B0604020202020204" pitchFamily="34" charset="0"/>
+            </a:endParaRPr>
+          </a:p>
+        </p:txBody>
+      </p:sp>
+      <p:pic>
+        <p:nvPicPr>
+          <p:cNvPr id="4" name="Picture 3"/>
+          <p:cNvPicPr>
+            <a:picLocks noChangeAspect="1"/>
+          </p:cNvPicPr>
+          <p:nvPr/>
+        </p:nvPicPr>
+        <p:blipFill>
+          <a:blip r:embed="rId2">
+            <a:extLst>
+              <a:ext uri="{28A0092B-C50C-407E-A947-70E740481C1C}">
+                <a14:useLocalDpi xmlns:a14="http://schemas.microsoft.com/office/drawing/2010/main" val="0"/>
+              </a:ext>
+            </a:extLst>
+          </a:blip>
+          <a:stretch>
+            <a:fillRect/>
+          </a:stretch>
+        </p:blipFill>
+        <p:spPr>
+          <a:xfrm>
+            <a:off x="2256760" y="2835446"/>
+            <a:ext cx="7739440" cy="3142022"/>
+          </a:xfrm>
+          <a:prstGeom prst="rect">
+            <a:avLst/>
+          </a:prstGeom>
+        </p:spPr>
+      </p:pic>
+      <p:sp>
+        <p:nvSpPr>
+          <p:cNvPr id="5" name="TextBox 4"/>
+          <p:cNvSpPr txBox="1"/>
+          <p:nvPr/>
+        </p:nvSpPr>
+        <p:spPr>
+          <a:xfrm>
+            <a:off x="3934213" y="5977468"/>
+            <a:ext cx="4384534" cy="307777"/>
+          </a:xfrm>
+          <a:prstGeom prst="rect">
+            <a:avLst/>
+          </a:prstGeom>
+          <a:noFill/>
+        </p:spPr>
+        <p:txBody>
+          <a:bodyPr wrap="none" rtlCol="0">
+            <a:spAutoFit/>
+          </a:bodyPr>
+          <a:lstStyle/>
+          <a:p>
+            <a:r>
+              <a:rPr lang="hr-HR" sz="1400" dirty="0" smtClean="0">
+                <a:latin typeface="Arial" panose="020B0604020202020204" pitchFamily="34" charset="0"/>
+                <a:cs typeface="Arial" panose="020B0604020202020204" pitchFamily="34" charset="0"/>
+              </a:rPr>
+              <a:t>Slika 4 Implementacija ograničavača ulaznog signala</a:t>
+            </a:r>
+            <a:endParaRPr lang="hr-HR" sz="1400" dirty="0">
+              <a:latin typeface="Arial" panose="020B0604020202020204" pitchFamily="34" charset="0"/>
+              <a:cs typeface="Arial" panose="020B0604020202020204" pitchFamily="34" charset="0"/>
+            </a:endParaRPr>
+          </a:p>
+        </p:txBody>
+      </p:sp>
+    </p:spTree>
+    <p:extLst>
+      <p:ext uri="{BB962C8B-B14F-4D97-AF65-F5344CB8AC3E}">
+        <p14:creationId xmlns:p14="http://schemas.microsoft.com/office/powerpoint/2010/main" val="2080087963"/>
+      </p:ext>
+    </p:extLst>
+  </p:cSld>
+  <p:clrMapOvr>
+    <a:masterClrMapping/>
+  </p:clrMapOvr>
+  <p:timing>
+    <p:tnLst>
+      <p:par>
+        <p:cTn id="1" dur="indefinite" restart="never" nodeType="tmRoot"/>
+      </p:par>
+    </p:tnLst>
+  </p:timing>
+</p:sld>
+</file>
+
+<file path=ppt/slides/slide18.xml><?xml version="1.0" encoding="utf-8"?>
+<p:sld xmlns:a="http://schemas.openxmlformats.org/drawingml/2006/main" xmlns:r="http://schemas.openxmlformats.org/officeDocument/2006/relationships" xmlns:p="http://schemas.openxmlformats.org/presentationml/2006/main">
+  <p:cSld>
+    <p:spTree>
+      <p:nvGrpSpPr>
+        <p:cNvPr id="1" name=""/>
+        <p:cNvGrpSpPr/>
+        <p:nvPr/>
+      </p:nvGrpSpPr>
+      <p:grpSpPr>
+        <a:xfrm>
+          <a:off x="0" y="0"/>
+          <a:ext cx="0" cy="0"/>
+          <a:chOff x="0" y="0"/>
+          <a:chExt cx="0" cy="0"/>
+        </a:xfrm>
+      </p:grpSpPr>
+      <p:sp>
+        <p:nvSpPr>
+          <p:cNvPr id="2" name="Title 1"/>
+          <p:cNvSpPr>
+            <a:spLocks noGrp="1"/>
+          </p:cNvSpPr>
+          <p:nvPr>
+            <p:ph type="title"/>
+          </p:nvPr>
+        </p:nvSpPr>
+        <p:spPr/>
+        <p:txBody>
+          <a:bodyPr/>
+          <a:lstStyle/>
+          <a:p>
+            <a:endParaRPr lang="hr-HR" dirty="0"/>
+          </a:p>
+        </p:txBody>
+      </p:sp>
+      <p:sp>
+        <p:nvSpPr>
+          <p:cNvPr id="3" name="Content Placeholder 2"/>
+          <p:cNvSpPr>
+            <a:spLocks noGrp="1"/>
+          </p:cNvSpPr>
+          <p:nvPr>
+            <p:ph idx="1"/>
+          </p:nvPr>
+        </p:nvSpPr>
+        <p:spPr/>
+        <p:txBody>
+          <a:bodyPr>
+            <a:normAutofit/>
+          </a:bodyPr>
+          <a:lstStyle/>
+          <a:p>
+            <a:r>
+              <a:rPr lang="hr-HR" sz="3400" dirty="0" smtClean="0">
+                <a:latin typeface="Arial" panose="020B0604020202020204" pitchFamily="34" charset="0"/>
+                <a:cs typeface="Arial" panose="020B0604020202020204" pitchFamily="34" charset="0"/>
+              </a:rPr>
+              <a:t>Povratna veza</a:t>
+            </a:r>
+          </a:p>
+          <a:p>
+            <a:pPr lvl="1"/>
+            <a:endParaRPr lang="hr-HR" sz="3200" dirty="0" smtClean="0">
+              <a:latin typeface="Arial" panose="020B0604020202020204" pitchFamily="34" charset="0"/>
+              <a:cs typeface="Arial" panose="020B0604020202020204" pitchFamily="34" charset="0"/>
+            </a:endParaRPr>
+          </a:p>
+          <a:p>
+            <a:pPr lvl="2"/>
+            <a:r>
+              <a:rPr lang="hr-HR" sz="2400" dirty="0" smtClean="0">
+                <a:latin typeface="Arial" panose="020B0604020202020204" pitchFamily="34" charset="0"/>
+                <a:cs typeface="Arial" panose="020B0604020202020204" pitchFamily="34" charset="0"/>
+              </a:rPr>
+              <a:t>Izlaz enkodera</a:t>
+            </a:r>
+          </a:p>
+          <a:p>
+            <a:pPr lvl="2"/>
+            <a:endParaRPr lang="hr-HR" sz="2400" dirty="0" smtClean="0">
+              <a:latin typeface="Arial" panose="020B0604020202020204" pitchFamily="34" charset="0"/>
+              <a:cs typeface="Arial" panose="020B0604020202020204" pitchFamily="34" charset="0"/>
+            </a:endParaRPr>
+          </a:p>
+          <a:p>
+            <a:pPr lvl="2"/>
+            <a:r>
+              <a:rPr lang="hr-HR" sz="2400" dirty="0" smtClean="0">
+                <a:latin typeface="Arial" panose="020B0604020202020204" pitchFamily="34" charset="0"/>
+                <a:cs typeface="Arial" panose="020B0604020202020204" pitchFamily="34" charset="0"/>
+              </a:rPr>
+              <a:t>Izračun brzine</a:t>
+            </a:r>
+          </a:p>
+          <a:p>
+            <a:pPr lvl="2"/>
+            <a:endParaRPr lang="hr-HR" sz="2800" dirty="0" smtClean="0">
+              <a:latin typeface="Arial" panose="020B0604020202020204" pitchFamily="34" charset="0"/>
+              <a:cs typeface="Arial" panose="020B0604020202020204" pitchFamily="34" charset="0"/>
+            </a:endParaRPr>
+          </a:p>
+        </p:txBody>
+      </p:sp>
+      <p:pic>
+        <p:nvPicPr>
+          <p:cNvPr id="4" name="Picture 3"/>
+          <p:cNvPicPr>
+            <a:picLocks noChangeAspect="1"/>
+          </p:cNvPicPr>
+          <p:nvPr/>
+        </p:nvPicPr>
+        <p:blipFill>
+          <a:blip r:embed="rId2">
+            <a:extLst>
+              <a:ext uri="{28A0092B-C50C-407E-A947-70E740481C1C}">
+                <a14:useLocalDpi xmlns:a14="http://schemas.microsoft.com/office/drawing/2010/main" val="0"/>
+              </a:ext>
+            </a:extLst>
+          </a:blip>
+          <a:stretch>
+            <a:fillRect/>
+          </a:stretch>
+        </p:blipFill>
+        <p:spPr>
+          <a:xfrm>
+            <a:off x="4631892" y="1845733"/>
+            <a:ext cx="6152964" cy="2667543"/>
+          </a:xfrm>
+          <a:prstGeom prst="rect">
+            <a:avLst/>
+          </a:prstGeom>
+        </p:spPr>
+      </p:pic>
+      <p:sp>
+        <p:nvSpPr>
+          <p:cNvPr id="5" name="TextBox 4"/>
+          <p:cNvSpPr txBox="1"/>
+          <p:nvPr/>
+        </p:nvSpPr>
+        <p:spPr>
+          <a:xfrm>
+            <a:off x="6123964" y="4689446"/>
+            <a:ext cx="3171061" cy="307777"/>
+          </a:xfrm>
+          <a:prstGeom prst="rect">
+            <a:avLst/>
+          </a:prstGeom>
+          <a:noFill/>
+        </p:spPr>
+        <p:txBody>
+          <a:bodyPr wrap="none" rtlCol="0">
+            <a:spAutoFit/>
+          </a:bodyPr>
+          <a:lstStyle/>
+          <a:p>
+            <a:r>
+              <a:rPr lang="hr-HR" sz="1400" dirty="0" smtClean="0">
+                <a:latin typeface="Arial" panose="020B0604020202020204" pitchFamily="34" charset="0"/>
+                <a:cs typeface="Arial" panose="020B0604020202020204" pitchFamily="34" charset="0"/>
+              </a:rPr>
+              <a:t>Slika 5 Blok dijagram izračuna brzine </a:t>
+            </a:r>
+            <a:endParaRPr lang="hr-HR" sz="1400" dirty="0">
+              <a:latin typeface="Arial" panose="020B0604020202020204" pitchFamily="34" charset="0"/>
+              <a:cs typeface="Arial" panose="020B0604020202020204" pitchFamily="34" charset="0"/>
+            </a:endParaRPr>
+          </a:p>
+        </p:txBody>
+      </p:sp>
+    </p:spTree>
+    <p:extLst>
+      <p:ext uri="{BB962C8B-B14F-4D97-AF65-F5344CB8AC3E}">
+        <p14:creationId xmlns:p14="http://schemas.microsoft.com/office/powerpoint/2010/main" val="3287447598"/>
+      </p:ext>
+    </p:extLst>
+  </p:cSld>
+  <p:clrMapOvr>
+    <a:masterClrMapping/>
+  </p:clrMapOvr>
+</p:sld>
+</file>
+
+<file path=ppt/slides/slide19.xml><?xml version="1.0" encoding="utf-8"?>
+<p:sld xmlns:a="http://schemas.openxmlformats.org/drawingml/2006/main" xmlns:r="http://schemas.openxmlformats.org/officeDocument/2006/relationships" xmlns:p="http://schemas.openxmlformats.org/presentationml/2006/main">
+  <p:cSld>
+    <p:spTree>
+      <p:nvGrpSpPr>
+        <p:cNvPr id="1" name=""/>
+        <p:cNvGrpSpPr/>
+        <p:nvPr/>
+      </p:nvGrpSpPr>
+      <p:grpSpPr>
+        <a:xfrm>
+          <a:off x="0" y="0"/>
+          <a:ext cx="0" cy="0"/>
+          <a:chOff x="0" y="0"/>
+          <a:chExt cx="0" cy="0"/>
+        </a:xfrm>
+      </p:grpSpPr>
+      <p:sp>
+        <p:nvSpPr>
+          <p:cNvPr id="2" name="Title 1"/>
+          <p:cNvSpPr>
+            <a:spLocks noGrp="1"/>
+          </p:cNvSpPr>
+          <p:nvPr>
+            <p:ph type="title"/>
+          </p:nvPr>
+        </p:nvSpPr>
+        <p:spPr/>
+        <p:txBody>
+          <a:bodyPr/>
+          <a:lstStyle/>
+          <a:p>
+            <a:endParaRPr lang="hr-HR"/>
+          </a:p>
+        </p:txBody>
+      </p:sp>
+      <mc:AlternateContent xmlns:mc="http://schemas.openxmlformats.org/markup-compatibility/2006" xmlns:a14="http://schemas.microsoft.com/office/drawing/2010/main">
+        <mc:Choice Requires="a14">
+          <p:sp>
+            <p:nvSpPr>
+              <p:cNvPr id="3" name="Content Placeholder 2"/>
+              <p:cNvSpPr>
+                <a:spLocks noGrp="1"/>
+              </p:cNvSpPr>
+              <p:nvPr>
+                <p:ph idx="1"/>
+              </p:nvPr>
+            </p:nvSpPr>
+            <p:spPr/>
+            <p:txBody>
+              <a:bodyPr>
+                <a:normAutofit/>
+              </a:bodyPr>
+              <a:lstStyle/>
+              <a:p>
+                <a:r>
+                  <a:rPr lang="hr-HR" sz="3400" dirty="0" smtClean="0">
+                    <a:latin typeface="Arial" panose="020B0604020202020204" pitchFamily="34" charset="0"/>
+                    <a:cs typeface="Arial" panose="020B0604020202020204" pitchFamily="34" charset="0"/>
+                  </a:rPr>
+                  <a:t>PI regulator</a:t>
+                </a:r>
+              </a:p>
+              <a:p>
+                <a:pPr lvl="2"/>
+                <a:r>
+                  <a:rPr lang="hr-HR" sz="2400" dirty="0" smtClean="0">
+                    <a:latin typeface="Arial" panose="020B0604020202020204" pitchFamily="34" charset="0"/>
+                    <a:cs typeface="Arial" panose="020B0604020202020204" pitchFamily="34" charset="0"/>
+                  </a:rPr>
+                  <a:t>Ziegler-Nichols parametrizacija</a:t>
+                </a:r>
+              </a:p>
+              <a:p>
+                <a:pPr marL="384048" lvl="2" indent="0">
+                  <a:buNone/>
+                </a:pPr>
+                <a:endParaRPr lang="hr-HR" sz="2400" b="0" i="1" dirty="0" smtClean="0">
+                  <a:latin typeface="Cambria Math" panose="02040503050406030204" pitchFamily="18" charset="0"/>
+                  <a:cs typeface="Arial" panose="020B0604020202020204" pitchFamily="34" charset="0"/>
+                </a:endParaRPr>
+              </a:p>
+              <a:p>
+                <a:pPr marL="384048" lvl="2" indent="0">
+                  <a:buNone/>
+                </a:pPr>
+                <a14:m>
+                  <m:oMathPara xmlns:m="http://schemas.openxmlformats.org/officeDocument/2006/math">
+                    <m:oMathParaPr>
+                      <m:jc m:val="centerGroup"/>
+                    </m:oMathParaPr>
+                    <m:oMath xmlns:m="http://schemas.openxmlformats.org/officeDocument/2006/math">
+                      <m:sSub>
+                        <m:sSubPr>
+                          <m:ctrlPr>
+                            <a:rPr lang="hr-HR" sz="2400" b="0" i="1" smtClean="0">
+                              <a:latin typeface="Cambria Math" panose="02040503050406030204" pitchFamily="18" charset="0"/>
+                              <a:cs typeface="Arial" panose="020B0604020202020204" pitchFamily="34" charset="0"/>
+                            </a:rPr>
+                          </m:ctrlPr>
+                        </m:sSubPr>
+                        <m:e>
+                          <m:r>
+                            <a:rPr lang="hr-HR" sz="2400" b="0" i="1" smtClean="0">
+                              <a:latin typeface="Cambria Math" panose="02040503050406030204" pitchFamily="18" charset="0"/>
+                              <a:cs typeface="Arial" panose="020B0604020202020204" pitchFamily="34" charset="0"/>
+                            </a:rPr>
+                            <m:t>𝐾</m:t>
+                          </m:r>
+                        </m:e>
+                        <m:sub>
+                          <m:r>
+                            <a:rPr lang="hr-HR" sz="2400" b="0" i="1" smtClean="0">
+                              <a:latin typeface="Cambria Math" panose="02040503050406030204" pitchFamily="18" charset="0"/>
+                              <a:cs typeface="Arial" panose="020B0604020202020204" pitchFamily="34" charset="0"/>
+                            </a:rPr>
+                            <m:t>𝑘𝑟</m:t>
+                          </m:r>
+                        </m:sub>
+                      </m:sSub>
+                      <m:r>
+                        <a:rPr lang="hr-HR" sz="2400" b="0" i="1" smtClean="0">
+                          <a:latin typeface="Cambria Math" panose="02040503050406030204" pitchFamily="18" charset="0"/>
+                          <a:cs typeface="Arial" panose="020B0604020202020204" pitchFamily="34" charset="0"/>
+                        </a:rPr>
+                        <m:t>=0.4444</m:t>
+                      </m:r>
+                    </m:oMath>
+                  </m:oMathPara>
+                </a14:m>
+                <a:endParaRPr lang="hr-HR" sz="2400" b="0" dirty="0" smtClean="0">
+                  <a:latin typeface="Arial" panose="020B0604020202020204" pitchFamily="34" charset="0"/>
+                  <a:cs typeface="Arial" panose="020B0604020202020204" pitchFamily="34" charset="0"/>
+                </a:endParaRPr>
+              </a:p>
+              <a:p>
+                <a:pPr marL="384048" lvl="2" indent="0">
+                  <a:buNone/>
+                </a:pPr>
+                <a14:m>
+                  <m:oMathPara xmlns:m="http://schemas.openxmlformats.org/officeDocument/2006/math">
+                    <m:oMathParaPr>
+                      <m:jc m:val="centerGroup"/>
+                    </m:oMathParaPr>
+                    <m:oMath xmlns:m="http://schemas.openxmlformats.org/officeDocument/2006/math">
+                      <m:sSub>
+                        <m:sSubPr>
+                          <m:ctrlPr>
+                            <a:rPr lang="hr-HR" sz="2400" b="0" i="1" smtClean="0">
+                              <a:latin typeface="Cambria Math" panose="02040503050406030204" pitchFamily="18" charset="0"/>
+                              <a:cs typeface="Arial" panose="020B0604020202020204" pitchFamily="34" charset="0"/>
+                            </a:rPr>
+                          </m:ctrlPr>
+                        </m:sSubPr>
+                        <m:e>
+                          <m:r>
+                            <a:rPr lang="hr-HR" sz="2400" b="0" i="1" smtClean="0">
+                              <a:latin typeface="Cambria Math" panose="02040503050406030204" pitchFamily="18" charset="0"/>
+                              <a:cs typeface="Arial" panose="020B0604020202020204" pitchFamily="34" charset="0"/>
+                            </a:rPr>
+                            <m:t>𝑇</m:t>
+                          </m:r>
+                        </m:e>
+                        <m:sub>
+                          <m:r>
+                            <a:rPr lang="hr-HR" sz="2400" b="0" i="1" smtClean="0">
+                              <a:latin typeface="Cambria Math" panose="02040503050406030204" pitchFamily="18" charset="0"/>
+                              <a:cs typeface="Arial" panose="020B0604020202020204" pitchFamily="34" charset="0"/>
+                            </a:rPr>
+                            <m:t>𝑘𝑟</m:t>
+                          </m:r>
+                        </m:sub>
+                      </m:sSub>
+                      <m:r>
+                        <a:rPr lang="hr-HR" sz="2400" b="0" i="1" smtClean="0">
+                          <a:latin typeface="Cambria Math" panose="02040503050406030204" pitchFamily="18" charset="0"/>
+                          <a:cs typeface="Arial" panose="020B0604020202020204" pitchFamily="34" charset="0"/>
+                        </a:rPr>
+                        <m:t>=0.024</m:t>
+                      </m:r>
+                      <m:r>
+                        <a:rPr lang="hr-HR" sz="2400" b="0" i="1" smtClean="0">
+                          <a:latin typeface="Cambria Math" panose="02040503050406030204" pitchFamily="18" charset="0"/>
+                          <a:cs typeface="Arial" panose="020B0604020202020204" pitchFamily="34" charset="0"/>
+                        </a:rPr>
+                        <m:t>𝑠</m:t>
+                      </m:r>
+                    </m:oMath>
+                  </m:oMathPara>
+                </a14:m>
+                <a:endParaRPr lang="hr-HR" sz="2400" b="0" dirty="0" smtClean="0">
+                  <a:latin typeface="Arial" panose="020B0604020202020204" pitchFamily="34" charset="0"/>
+                  <a:cs typeface="Arial" panose="020B0604020202020204" pitchFamily="34" charset="0"/>
+                </a:endParaRPr>
+              </a:p>
+              <a:p>
+                <a:pPr marL="384048" lvl="2" indent="0">
+                  <a:buNone/>
+                </a:pPr>
+                <a14:m>
+                  <m:oMathPara xmlns:m="http://schemas.openxmlformats.org/officeDocument/2006/math">
+                    <m:oMathParaPr>
+                      <m:jc m:val="centerGroup"/>
+                    </m:oMathParaPr>
+                    <m:oMath xmlns:m="http://schemas.openxmlformats.org/officeDocument/2006/math">
+                      <m:sSub>
+                        <m:sSubPr>
+                          <m:ctrlPr>
+                            <a:rPr lang="hr-HR" sz="2400" b="0" i="1" smtClean="0">
+                              <a:latin typeface="Cambria Math" panose="02040503050406030204" pitchFamily="18" charset="0"/>
+                              <a:cs typeface="Arial" panose="020B0604020202020204" pitchFamily="34" charset="0"/>
+                            </a:rPr>
+                          </m:ctrlPr>
+                        </m:sSubPr>
+                        <m:e>
+                          <m:r>
+                            <a:rPr lang="hr-HR" sz="2400" b="0" i="1" smtClean="0">
+                              <a:latin typeface="Cambria Math" panose="02040503050406030204" pitchFamily="18" charset="0"/>
+                              <a:cs typeface="Arial" panose="020B0604020202020204" pitchFamily="34" charset="0"/>
+                            </a:rPr>
+                            <m:t>𝐾</m:t>
+                          </m:r>
+                        </m:e>
+                        <m:sub>
+                          <m:r>
+                            <a:rPr lang="hr-HR" sz="2400" b="0" i="1" smtClean="0">
+                              <a:latin typeface="Cambria Math" panose="02040503050406030204" pitchFamily="18" charset="0"/>
+                              <a:cs typeface="Arial" panose="020B0604020202020204" pitchFamily="34" charset="0"/>
+                            </a:rPr>
+                            <m:t>𝐼</m:t>
+                          </m:r>
+                        </m:sub>
+                      </m:sSub>
+                      <m:r>
+                        <a:rPr lang="hr-HR" sz="2400" b="0" i="1" smtClean="0">
+                          <a:latin typeface="Cambria Math" panose="02040503050406030204" pitchFamily="18" charset="0"/>
+                          <a:cs typeface="Arial" panose="020B0604020202020204" pitchFamily="34" charset="0"/>
+                        </a:rPr>
+                        <m:t>=0.45∗</m:t>
+                      </m:r>
+                      <m:sSub>
+                        <m:sSubPr>
+                          <m:ctrlPr>
+                            <a:rPr lang="hr-HR" sz="2400" b="0" i="1" smtClean="0">
+                              <a:latin typeface="Cambria Math" panose="02040503050406030204" pitchFamily="18" charset="0"/>
+                              <a:cs typeface="Arial" panose="020B0604020202020204" pitchFamily="34" charset="0"/>
+                            </a:rPr>
+                          </m:ctrlPr>
+                        </m:sSubPr>
+                        <m:e>
+                          <m:r>
+                            <a:rPr lang="hr-HR" sz="2400" b="0" i="1" smtClean="0">
+                              <a:latin typeface="Cambria Math" panose="02040503050406030204" pitchFamily="18" charset="0"/>
+                              <a:cs typeface="Arial" panose="020B0604020202020204" pitchFamily="34" charset="0"/>
+                            </a:rPr>
+                            <m:t>𝐾</m:t>
+                          </m:r>
+                        </m:e>
+                        <m:sub>
+                          <m:r>
+                            <a:rPr lang="hr-HR" sz="2400" b="0" i="1" smtClean="0">
+                              <a:latin typeface="Cambria Math" panose="02040503050406030204" pitchFamily="18" charset="0"/>
+                              <a:cs typeface="Arial" panose="020B0604020202020204" pitchFamily="34" charset="0"/>
+                            </a:rPr>
+                            <m:t>𝑘𝑟</m:t>
+                          </m:r>
+                        </m:sub>
+                      </m:sSub>
+                      <m:r>
+                        <a:rPr lang="hr-HR" sz="2400" b="0" i="1" smtClean="0">
+                          <a:latin typeface="Cambria Math" panose="02040503050406030204" pitchFamily="18" charset="0"/>
+                          <a:cs typeface="Arial" panose="020B0604020202020204" pitchFamily="34" charset="0"/>
+                        </a:rPr>
+                        <m:t>=0.2</m:t>
+                      </m:r>
+                    </m:oMath>
+                  </m:oMathPara>
+                </a14:m>
+                <a:endParaRPr lang="hr-HR" sz="2400" b="0" dirty="0" smtClean="0">
+                  <a:latin typeface="Arial" panose="020B0604020202020204" pitchFamily="34" charset="0"/>
+                  <a:cs typeface="Arial" panose="020B0604020202020204" pitchFamily="34" charset="0"/>
+                </a:endParaRPr>
+              </a:p>
+              <a:p>
+                <a:pPr marL="384048" lvl="2" indent="0">
+                  <a:buNone/>
+                </a:pPr>
+                <a14:m>
+                  <m:oMathPara xmlns:m="http://schemas.openxmlformats.org/officeDocument/2006/math">
+                    <m:oMathParaPr>
+                      <m:jc m:val="centerGroup"/>
+                    </m:oMathParaPr>
+                    <m:oMath xmlns:m="http://schemas.openxmlformats.org/officeDocument/2006/math">
+                      <m:sSub>
+                        <m:sSubPr>
+                          <m:ctrlPr>
+                            <a:rPr lang="hr-HR" sz="2400" b="0" i="1" smtClean="0">
+                              <a:latin typeface="Cambria Math" panose="02040503050406030204" pitchFamily="18" charset="0"/>
+                              <a:cs typeface="Arial" panose="020B0604020202020204" pitchFamily="34" charset="0"/>
+                            </a:rPr>
+                          </m:ctrlPr>
+                        </m:sSubPr>
+                        <m:e>
+                          <m:r>
+                            <a:rPr lang="hr-HR" sz="2400" b="0" i="1" smtClean="0">
+                              <a:latin typeface="Cambria Math" panose="02040503050406030204" pitchFamily="18" charset="0"/>
+                              <a:cs typeface="Arial" panose="020B0604020202020204" pitchFamily="34" charset="0"/>
+                            </a:rPr>
+                            <m:t>𝑇</m:t>
+                          </m:r>
+                        </m:e>
+                        <m:sub>
+                          <m:r>
+                            <a:rPr lang="hr-HR" sz="2400" b="0" i="1" smtClean="0">
+                              <a:latin typeface="Cambria Math" panose="02040503050406030204" pitchFamily="18" charset="0"/>
+                              <a:cs typeface="Arial" panose="020B0604020202020204" pitchFamily="34" charset="0"/>
+                            </a:rPr>
+                            <m:t>𝐼</m:t>
+                          </m:r>
+                        </m:sub>
+                      </m:sSub>
+                      <m:r>
+                        <a:rPr lang="hr-HR" sz="2400" b="0" i="1" smtClean="0">
+                          <a:latin typeface="Cambria Math" panose="02040503050406030204" pitchFamily="18" charset="0"/>
+                          <a:cs typeface="Arial" panose="020B0604020202020204" pitchFamily="34" charset="0"/>
+                        </a:rPr>
+                        <m:t>=</m:t>
+                      </m:r>
+                      <m:sSub>
+                        <m:sSubPr>
+                          <m:ctrlPr>
+                            <a:rPr lang="hr-HR" sz="2400" b="0" i="1" smtClean="0">
+                              <a:latin typeface="Cambria Math" panose="02040503050406030204" pitchFamily="18" charset="0"/>
+                              <a:cs typeface="Arial" panose="020B0604020202020204" pitchFamily="34" charset="0"/>
+                            </a:rPr>
+                          </m:ctrlPr>
+                        </m:sSubPr>
+                        <m:e>
+                          <m:r>
+                            <a:rPr lang="hr-HR" sz="2400" b="0" i="1" smtClean="0">
+                              <a:latin typeface="Cambria Math" panose="02040503050406030204" pitchFamily="18" charset="0"/>
+                              <a:cs typeface="Arial" panose="020B0604020202020204" pitchFamily="34" charset="0"/>
+                            </a:rPr>
+                            <m:t>𝑇</m:t>
+                          </m:r>
+                        </m:e>
+                        <m:sub>
+                          <m:r>
+                            <a:rPr lang="hr-HR" sz="2400" b="0" i="1" smtClean="0">
+                              <a:latin typeface="Cambria Math" panose="02040503050406030204" pitchFamily="18" charset="0"/>
+                              <a:cs typeface="Arial" panose="020B0604020202020204" pitchFamily="34" charset="0"/>
+                            </a:rPr>
+                            <m:t>𝑘𝑟</m:t>
+                          </m:r>
+                        </m:sub>
+                      </m:sSub>
+                      <m:r>
+                        <a:rPr lang="hr-HR" sz="2400" b="0" i="1" smtClean="0">
+                          <a:latin typeface="Cambria Math" panose="02040503050406030204" pitchFamily="18" charset="0"/>
+                          <a:cs typeface="Arial" panose="020B0604020202020204" pitchFamily="34" charset="0"/>
+                        </a:rPr>
+                        <m:t>/ 1.2=0.02</m:t>
+                      </m:r>
+                      <m:r>
+                        <a:rPr lang="hr-HR" sz="2400" b="0" i="1" smtClean="0">
+                          <a:latin typeface="Cambria Math" panose="02040503050406030204" pitchFamily="18" charset="0"/>
+                          <a:cs typeface="Arial" panose="020B0604020202020204" pitchFamily="34" charset="0"/>
+                        </a:rPr>
+                        <m:t>𝑠</m:t>
+                      </m:r>
+                    </m:oMath>
+                  </m:oMathPara>
+                </a14:m>
+                <a:endParaRPr lang="hr-HR" sz="2400" dirty="0">
+                  <a:latin typeface="Arial" panose="020B0604020202020204" pitchFamily="34" charset="0"/>
+                  <a:cs typeface="Arial" panose="020B0604020202020204" pitchFamily="34" charset="0"/>
+                </a:endParaRPr>
+              </a:p>
+            </p:txBody>
+          </p:sp>
+        </mc:Choice>
+        <mc:Fallback xmlns="">
+          <p:sp>
+            <p:nvSpPr>
+              <p:cNvPr id="3" name="Content Placeholder 2"/>
+              <p:cNvSpPr>
+                <a:spLocks noGrp="1" noRot="1" noChangeAspect="1" noMove="1" noResize="1" noEditPoints="1" noAdjustHandles="1" noChangeArrowheads="1" noChangeShapeType="1" noTextEdit="1"/>
+              </p:cNvSpPr>
+              <p:nvPr>
+                <p:ph idx="1"/>
+              </p:nvPr>
+            </p:nvSpPr>
+            <p:spPr>
+              <a:blipFill>
+                <a:blip r:embed="rId2"/>
+                <a:stretch>
+                  <a:fillRect l="-1394" t="-3485"/>
+                </a:stretch>
+              </a:blipFill>
+            </p:spPr>
+            <p:txBody>
+              <a:bodyPr/>
+              <a:lstStyle/>
+              <a:p>
+                <a:r>
+                  <a:rPr lang="hr-HR">
+                    <a:noFill/>
+                  </a:rPr>
+                  <a:t> </a:t>
+                </a:r>
+              </a:p>
+            </p:txBody>
+          </p:sp>
+        </mc:Fallback>
+      </mc:AlternateContent>
+    </p:spTree>
+    <p:extLst>
+      <p:ext uri="{BB962C8B-B14F-4D97-AF65-F5344CB8AC3E}">
+        <p14:creationId xmlns:p14="http://schemas.microsoft.com/office/powerpoint/2010/main" val="1005975027"/>
       </p:ext>
     </p:extLst>
   </p:cSld>
@@ -4762,7 +6129,20 @@
             </a:pPr>
             <a:r>
               <a:rPr lang="hr-HR" sz="2400" dirty="0" smtClean="0"/>
-              <a:t>Rješenje upravljanja motorom</a:t>
+              <a:t>Rješenje upravljanja </a:t>
+            </a:r>
+            <a:r>
+              <a:rPr lang="hr-HR" sz="2400" dirty="0" smtClean="0"/>
+              <a:t>motorom</a:t>
+            </a:r>
+          </a:p>
+          <a:p>
+            <a:pPr marL="544068" lvl="1" indent="-342900">
+              <a:buAutoNum type="arabicPeriod"/>
+            </a:pPr>
+            <a:r>
+              <a:rPr lang="hr-HR" sz="2400" dirty="0" smtClean="0"/>
+              <a:t>Zaključak</a:t>
             </a:r>
             <a:endParaRPr lang="hr-HR" sz="2400" dirty="0"/>
           </a:p>
@@ -4785,6 +6165,559 @@
       </p:par>
     </p:tnLst>
   </p:timing>
+</p:sld>
+</file>
+
+<file path=ppt/slides/slide20.xml><?xml version="1.0" encoding="utf-8"?>
+<p:sld xmlns:a="http://schemas.openxmlformats.org/drawingml/2006/main" xmlns:r="http://schemas.openxmlformats.org/officeDocument/2006/relationships" xmlns:p="http://schemas.openxmlformats.org/presentationml/2006/main">
+  <p:cSld>
+    <p:spTree>
+      <p:nvGrpSpPr>
+        <p:cNvPr id="1" name=""/>
+        <p:cNvGrpSpPr/>
+        <p:nvPr/>
+      </p:nvGrpSpPr>
+      <p:grpSpPr>
+        <a:xfrm>
+          <a:off x="0" y="0"/>
+          <a:ext cx="0" cy="0"/>
+          <a:chOff x="0" y="0"/>
+          <a:chExt cx="0" cy="0"/>
+        </a:xfrm>
+      </p:grpSpPr>
+      <p:sp>
+        <p:nvSpPr>
+          <p:cNvPr id="2" name="Title 1"/>
+          <p:cNvSpPr>
+            <a:spLocks noGrp="1"/>
+          </p:cNvSpPr>
+          <p:nvPr>
+            <p:ph type="title"/>
+          </p:nvPr>
+        </p:nvSpPr>
+        <p:spPr/>
+        <p:txBody>
+          <a:bodyPr/>
+          <a:lstStyle/>
+          <a:p>
+            <a:endParaRPr lang="hr-HR"/>
+          </a:p>
+        </p:txBody>
+      </p:sp>
+      <p:pic>
+        <p:nvPicPr>
+          <p:cNvPr id="5" name="Content Placeholder 4"/>
+          <p:cNvPicPr>
+            <a:picLocks noGrp="1" noChangeAspect="1"/>
+          </p:cNvPicPr>
+          <p:nvPr>
+            <p:ph idx="1"/>
+          </p:nvPr>
+        </p:nvPicPr>
+        <p:blipFill>
+          <a:blip r:embed="rId2">
+            <a:extLst>
+              <a:ext uri="{28A0092B-C50C-407E-A947-70E740481C1C}">
+                <a14:useLocalDpi xmlns:a14="http://schemas.microsoft.com/office/drawing/2010/main" val="0"/>
+              </a:ext>
+            </a:extLst>
+          </a:blip>
+          <a:stretch>
+            <a:fillRect/>
+          </a:stretch>
+        </p:blipFill>
+        <p:spPr>
+          <a:xfrm>
+            <a:off x="1095704" y="286603"/>
+            <a:ext cx="10059975" cy="5057184"/>
+          </a:xfrm>
+        </p:spPr>
+      </p:pic>
+      <p:sp>
+        <p:nvSpPr>
+          <p:cNvPr id="6" name="TextBox 5"/>
+          <p:cNvSpPr txBox="1"/>
+          <p:nvPr/>
+        </p:nvSpPr>
+        <p:spPr>
+          <a:xfrm>
+            <a:off x="4952934" y="5595457"/>
+            <a:ext cx="2932213" cy="307777"/>
+          </a:xfrm>
+          <a:prstGeom prst="rect">
+            <a:avLst/>
+          </a:prstGeom>
+          <a:noFill/>
+        </p:spPr>
+        <p:txBody>
+          <a:bodyPr wrap="none" rtlCol="0">
+            <a:spAutoFit/>
+          </a:bodyPr>
+          <a:lstStyle/>
+          <a:p>
+            <a:r>
+              <a:rPr lang="hr-HR" sz="1400" dirty="0" smtClean="0">
+                <a:latin typeface="Arial" panose="020B0604020202020204" pitchFamily="34" charset="0"/>
+                <a:cs typeface="Arial" panose="020B0604020202020204" pitchFamily="34" charset="0"/>
+              </a:rPr>
+              <a:t>Slika 6 Grafički rezultat upravljanja</a:t>
+            </a:r>
+            <a:endParaRPr lang="hr-HR" sz="1400" dirty="0">
+              <a:latin typeface="Arial" panose="020B0604020202020204" pitchFamily="34" charset="0"/>
+              <a:cs typeface="Arial" panose="020B0604020202020204" pitchFamily="34" charset="0"/>
+            </a:endParaRPr>
+          </a:p>
+        </p:txBody>
+      </p:sp>
+    </p:spTree>
+    <p:extLst>
+      <p:ext uri="{BB962C8B-B14F-4D97-AF65-F5344CB8AC3E}">
+        <p14:creationId xmlns:p14="http://schemas.microsoft.com/office/powerpoint/2010/main" val="1428271846"/>
+      </p:ext>
+    </p:extLst>
+  </p:cSld>
+  <p:clrMapOvr>
+    <a:masterClrMapping/>
+  </p:clrMapOvr>
+</p:sld>
+</file>
+
+<file path=ppt/slides/slide21.xml><?xml version="1.0" encoding="utf-8"?>
+<p:sld xmlns:a="http://schemas.openxmlformats.org/drawingml/2006/main" xmlns:r="http://schemas.openxmlformats.org/officeDocument/2006/relationships" xmlns:p="http://schemas.openxmlformats.org/presentationml/2006/main">
+  <p:cSld>
+    <p:spTree>
+      <p:nvGrpSpPr>
+        <p:cNvPr id="1" name=""/>
+        <p:cNvGrpSpPr/>
+        <p:nvPr/>
+      </p:nvGrpSpPr>
+      <p:grpSpPr>
+        <a:xfrm>
+          <a:off x="0" y="0"/>
+          <a:ext cx="0" cy="0"/>
+          <a:chOff x="0" y="0"/>
+          <a:chExt cx="0" cy="0"/>
+        </a:xfrm>
+      </p:grpSpPr>
+      <p:sp>
+        <p:nvSpPr>
+          <p:cNvPr id="2" name="Title 1"/>
+          <p:cNvSpPr>
+            <a:spLocks noGrp="1"/>
+          </p:cNvSpPr>
+          <p:nvPr>
+            <p:ph type="title"/>
+          </p:nvPr>
+        </p:nvSpPr>
+        <p:spPr/>
+        <p:txBody>
+          <a:bodyPr/>
+          <a:lstStyle/>
+          <a:p>
+            <a:endParaRPr lang="hr-HR"/>
+          </a:p>
+        </p:txBody>
+      </p:sp>
+      <mc:AlternateContent xmlns:mc="http://schemas.openxmlformats.org/markup-compatibility/2006" xmlns:a14="http://schemas.microsoft.com/office/drawing/2010/main">
+        <mc:Choice Requires="a14">
+          <p:sp>
+            <p:nvSpPr>
+              <p:cNvPr id="3" name="Content Placeholder 2"/>
+              <p:cNvSpPr>
+                <a:spLocks noGrp="1"/>
+              </p:cNvSpPr>
+              <p:nvPr>
+                <p:ph idx="1"/>
+              </p:nvPr>
+            </p:nvSpPr>
+            <p:spPr/>
+            <p:txBody>
+              <a:bodyPr/>
+              <a:lstStyle/>
+              <a:p>
+                <a:r>
+                  <a:rPr lang="hr-HR" sz="3400" dirty="0" smtClean="0">
+                    <a:latin typeface="Arial" panose="020B0604020202020204" pitchFamily="34" charset="0"/>
+                    <a:cs typeface="Arial" panose="020B0604020202020204" pitchFamily="34" charset="0"/>
+                  </a:rPr>
+                  <a:t>Numerički rezultat upravljanja</a:t>
+                </a:r>
+                <a:endParaRPr lang="hr-HR" sz="3400" b="0" dirty="0" smtClean="0">
+                  <a:latin typeface="Arial" panose="020B0604020202020204" pitchFamily="34" charset="0"/>
+                  <a:cs typeface="Arial" panose="020B0604020202020204" pitchFamily="34" charset="0"/>
+                </a:endParaRPr>
+              </a:p>
+              <a:p>
+                <a:pPr algn="ctr"/>
+                <a:endParaRPr lang="hr-HR" i="1" dirty="0">
+                  <a:latin typeface="Cambria Math" panose="02040503050406030204" pitchFamily="18" charset="0"/>
+                </a:endParaRPr>
+              </a:p>
+              <a:p>
+                <a:pPr algn="ctr"/>
+                <a14:m>
+                  <m:oMath xmlns:m="http://schemas.openxmlformats.org/officeDocument/2006/math">
+                    <m:sSub>
+                      <m:sSubPr>
+                        <m:ctrlPr>
+                          <a:rPr lang="hr-HR" b="0" i="1" smtClean="0">
+                            <a:latin typeface="Cambria Math" panose="02040503050406030204" pitchFamily="18" charset="0"/>
+                          </a:rPr>
+                        </m:ctrlPr>
+                      </m:sSubPr>
+                      <m:e>
+                        <m:r>
+                          <a:rPr lang="hr-HR" b="0" i="1" smtClean="0">
+                            <a:latin typeface="Cambria Math" panose="02040503050406030204" pitchFamily="18" charset="0"/>
+                          </a:rPr>
+                          <m:t>𝜎</m:t>
+                        </m:r>
+                      </m:e>
+                      <m:sub>
+                        <m:r>
+                          <a:rPr lang="hr-HR" b="0" i="1" smtClean="0">
+                            <a:latin typeface="Cambria Math" panose="02040503050406030204" pitchFamily="18" charset="0"/>
+                          </a:rPr>
+                          <m:t>𝑚</m:t>
+                        </m:r>
+                      </m:sub>
+                    </m:sSub>
+                    <m:d>
+                      <m:dPr>
+                        <m:begChr m:val="["/>
+                        <m:endChr m:val="]"/>
+                        <m:ctrlPr>
+                          <a:rPr lang="hr-HR" b="0" i="1" smtClean="0">
+                            <a:latin typeface="Cambria Math" panose="02040503050406030204" pitchFamily="18" charset="0"/>
+                          </a:rPr>
+                        </m:ctrlPr>
+                      </m:dPr>
+                      <m:e>
+                        <m:r>
+                          <a:rPr lang="hr-HR" b="0" i="1" smtClean="0">
+                            <a:latin typeface="Cambria Math" panose="02040503050406030204" pitchFamily="18" charset="0"/>
+                          </a:rPr>
+                          <m:t>%</m:t>
+                        </m:r>
+                      </m:e>
+                    </m:d>
+                    <m:r>
+                      <a:rPr lang="hr-HR" b="0" i="1" smtClean="0">
+                        <a:latin typeface="Cambria Math" panose="02040503050406030204" pitchFamily="18" charset="0"/>
+                      </a:rPr>
+                      <m:t>=7.12 %</m:t>
+                    </m:r>
+                  </m:oMath>
+                </a14:m>
+                <a:endParaRPr lang="hr-HR" b="0" dirty="0" smtClean="0"/>
+              </a:p>
+              <a:p>
+                <a:pPr algn="ctr"/>
+                <a14:m>
+                  <m:oMath xmlns:m="http://schemas.openxmlformats.org/officeDocument/2006/math">
+                    <m:sSub>
+                      <m:sSubPr>
+                        <m:ctrlPr>
+                          <a:rPr lang="hr-HR" b="0" i="1" smtClean="0">
+                            <a:latin typeface="Cambria Math" panose="02040503050406030204" pitchFamily="18" charset="0"/>
+                          </a:rPr>
+                        </m:ctrlPr>
+                      </m:sSubPr>
+                      <m:e>
+                        <m:r>
+                          <a:rPr lang="hr-HR" b="0" i="1" smtClean="0">
+                            <a:latin typeface="Cambria Math" panose="02040503050406030204" pitchFamily="18" charset="0"/>
+                          </a:rPr>
+                          <m:t>𝑡</m:t>
+                        </m:r>
+                      </m:e>
+                      <m:sub>
+                        <m:r>
+                          <a:rPr lang="hr-HR" b="0" i="1" smtClean="0">
+                            <a:latin typeface="Cambria Math" panose="02040503050406030204" pitchFamily="18" charset="0"/>
+                          </a:rPr>
+                          <m:t>𝑚</m:t>
+                        </m:r>
+                      </m:sub>
+                    </m:sSub>
+                    <m:r>
+                      <a:rPr lang="hr-HR" b="0" i="1" smtClean="0">
+                        <a:latin typeface="Cambria Math" panose="02040503050406030204" pitchFamily="18" charset="0"/>
+                      </a:rPr>
+                      <m:t>=98.04 </m:t>
+                    </m:r>
+                    <m:r>
+                      <a:rPr lang="hr-HR" b="0" i="1" smtClean="0">
+                        <a:latin typeface="Cambria Math" panose="02040503050406030204" pitchFamily="18" charset="0"/>
+                      </a:rPr>
+                      <m:t>𝑚𝑠</m:t>
+                    </m:r>
+                  </m:oMath>
+                </a14:m>
+                <a:endParaRPr lang="hr-HR" b="0" dirty="0" smtClean="0"/>
+              </a:p>
+              <a:p>
+                <a:pPr algn="ctr"/>
+                <a14:m>
+                  <m:oMath xmlns:m="http://schemas.openxmlformats.org/officeDocument/2006/math">
+                    <m:sSub>
+                      <m:sSubPr>
+                        <m:ctrlPr>
+                          <a:rPr lang="hr-HR" b="0" i="1" smtClean="0">
+                            <a:latin typeface="Cambria Math" panose="02040503050406030204" pitchFamily="18" charset="0"/>
+                          </a:rPr>
+                        </m:ctrlPr>
+                      </m:sSubPr>
+                      <m:e>
+                        <m:r>
+                          <a:rPr lang="hr-HR" b="0" i="1" smtClean="0">
+                            <a:latin typeface="Cambria Math" panose="02040503050406030204" pitchFamily="18" charset="0"/>
+                          </a:rPr>
+                          <m:t>𝑡</m:t>
+                        </m:r>
+                      </m:e>
+                      <m:sub>
+                        <m:r>
+                          <a:rPr lang="hr-HR" b="0" i="1" smtClean="0">
+                            <a:latin typeface="Cambria Math" panose="02040503050406030204" pitchFamily="18" charset="0"/>
+                          </a:rPr>
+                          <m:t>𝑟</m:t>
+                        </m:r>
+                      </m:sub>
+                    </m:sSub>
+                    <m:r>
+                      <a:rPr lang="hr-HR" b="0" i="1" smtClean="0">
+                        <a:latin typeface="Cambria Math" panose="02040503050406030204" pitchFamily="18" charset="0"/>
+                      </a:rPr>
+                      <m:t>=61.76 </m:t>
+                    </m:r>
+                    <m:r>
+                      <a:rPr lang="hr-HR" b="0" i="1" smtClean="0">
+                        <a:latin typeface="Cambria Math" panose="02040503050406030204" pitchFamily="18" charset="0"/>
+                      </a:rPr>
+                      <m:t>𝑚𝑠</m:t>
+                    </m:r>
+                  </m:oMath>
+                </a14:m>
+                <a:endParaRPr lang="hr-HR" b="0" dirty="0" smtClean="0"/>
+              </a:p>
+              <a:p>
+                <a:pPr algn="ctr"/>
+                <a14:m>
+                  <m:oMath xmlns:m="http://schemas.openxmlformats.org/officeDocument/2006/math">
+                    <m:sSub>
+                      <m:sSubPr>
+                        <m:ctrlPr>
+                          <a:rPr lang="hr-HR" b="0" i="1" smtClean="0">
+                            <a:latin typeface="Cambria Math" panose="02040503050406030204" pitchFamily="18" charset="0"/>
+                          </a:rPr>
+                        </m:ctrlPr>
+                      </m:sSubPr>
+                      <m:e>
+                        <m:r>
+                          <a:rPr lang="hr-HR" b="0" i="1" smtClean="0">
+                            <a:latin typeface="Cambria Math" panose="02040503050406030204" pitchFamily="18" charset="0"/>
+                          </a:rPr>
+                          <m:t>𝑡</m:t>
+                        </m:r>
+                      </m:e>
+                      <m:sub>
+                        <m:r>
+                          <a:rPr lang="hr-HR" b="0" i="1" smtClean="0">
+                            <a:latin typeface="Cambria Math" panose="02040503050406030204" pitchFamily="18" charset="0"/>
+                          </a:rPr>
+                          <m:t>1%</m:t>
+                        </m:r>
+                      </m:sub>
+                    </m:sSub>
+                    <m:r>
+                      <a:rPr lang="hr-HR" b="0" i="1" smtClean="0">
+                        <a:latin typeface="Cambria Math" panose="02040503050406030204" pitchFamily="18" charset="0"/>
+                      </a:rPr>
+                      <m:t>=141.59 </m:t>
+                    </m:r>
+                    <m:r>
+                      <a:rPr lang="hr-HR" b="0" i="1" smtClean="0">
+                        <a:latin typeface="Cambria Math" panose="02040503050406030204" pitchFamily="18" charset="0"/>
+                      </a:rPr>
+                      <m:t>𝑚𝑠</m:t>
+                    </m:r>
+                  </m:oMath>
+                </a14:m>
+                <a:endParaRPr lang="hr-HR" dirty="0"/>
+              </a:p>
+            </p:txBody>
+          </p:sp>
+        </mc:Choice>
+        <mc:Fallback xmlns="">
+          <p:sp>
+            <p:nvSpPr>
+              <p:cNvPr id="3" name="Content Placeholder 2"/>
+              <p:cNvSpPr>
+                <a:spLocks noGrp="1" noRot="1" noChangeAspect="1" noMove="1" noResize="1" noEditPoints="1" noAdjustHandles="1" noChangeArrowheads="1" noChangeShapeType="1" noTextEdit="1"/>
+              </p:cNvSpPr>
+              <p:nvPr>
+                <p:ph idx="1"/>
+              </p:nvPr>
+            </p:nvSpPr>
+            <p:spPr>
+              <a:blipFill>
+                <a:blip r:embed="rId2"/>
+                <a:stretch>
+                  <a:fillRect l="-1394" t="-3485"/>
+                </a:stretch>
+              </a:blipFill>
+            </p:spPr>
+            <p:txBody>
+              <a:bodyPr/>
+              <a:lstStyle/>
+              <a:p>
+                <a:r>
+                  <a:rPr lang="hr-HR">
+                    <a:noFill/>
+                  </a:rPr>
+                  <a:t> </a:t>
+                </a:r>
+              </a:p>
+            </p:txBody>
+          </p:sp>
+        </mc:Fallback>
+      </mc:AlternateContent>
+    </p:spTree>
+    <p:extLst>
+      <p:ext uri="{BB962C8B-B14F-4D97-AF65-F5344CB8AC3E}">
+        <p14:creationId xmlns:p14="http://schemas.microsoft.com/office/powerpoint/2010/main" val="3125877403"/>
+      </p:ext>
+    </p:extLst>
+  </p:cSld>
+  <p:clrMapOvr>
+    <a:masterClrMapping/>
+  </p:clrMapOvr>
+</p:sld>
+</file>
+
+<file path=ppt/slides/slide22.xml><?xml version="1.0" encoding="utf-8"?>
+<p:sld xmlns:a="http://schemas.openxmlformats.org/drawingml/2006/main" xmlns:r="http://schemas.openxmlformats.org/officeDocument/2006/relationships" xmlns:p="http://schemas.openxmlformats.org/presentationml/2006/main">
+  <p:cSld>
+    <p:spTree>
+      <p:nvGrpSpPr>
+        <p:cNvPr id="1" name=""/>
+        <p:cNvGrpSpPr/>
+        <p:nvPr/>
+      </p:nvGrpSpPr>
+      <p:grpSpPr>
+        <a:xfrm>
+          <a:off x="0" y="0"/>
+          <a:ext cx="0" cy="0"/>
+          <a:chOff x="0" y="0"/>
+          <a:chExt cx="0" cy="0"/>
+        </a:xfrm>
+      </p:grpSpPr>
+      <p:sp>
+        <p:nvSpPr>
+          <p:cNvPr id="2" name="Title 1"/>
+          <p:cNvSpPr>
+            <a:spLocks noGrp="1"/>
+          </p:cNvSpPr>
+          <p:nvPr>
+            <p:ph type="title"/>
+          </p:nvPr>
+        </p:nvSpPr>
+        <p:spPr/>
+        <p:txBody>
+          <a:bodyPr/>
+          <a:lstStyle/>
+          <a:p>
+            <a:r>
+              <a:rPr lang="hr-HR" dirty="0" smtClean="0">
+                <a:latin typeface="Arial" panose="020B0604020202020204" pitchFamily="34" charset="0"/>
+                <a:cs typeface="Arial" panose="020B0604020202020204" pitchFamily="34" charset="0"/>
+              </a:rPr>
+              <a:t>5. Zaključak</a:t>
+            </a:r>
+            <a:endParaRPr lang="hr-HR" dirty="0">
+              <a:latin typeface="Arial" panose="020B0604020202020204" pitchFamily="34" charset="0"/>
+              <a:cs typeface="Arial" panose="020B0604020202020204" pitchFamily="34" charset="0"/>
+            </a:endParaRPr>
+          </a:p>
+        </p:txBody>
+      </p:sp>
+      <p:sp>
+        <p:nvSpPr>
+          <p:cNvPr id="3" name="Content Placeholder 2"/>
+          <p:cNvSpPr>
+            <a:spLocks noGrp="1"/>
+          </p:cNvSpPr>
+          <p:nvPr>
+            <p:ph idx="1"/>
+          </p:nvPr>
+        </p:nvSpPr>
+        <p:spPr/>
+        <p:txBody>
+          <a:bodyPr>
+            <a:normAutofit/>
+          </a:bodyPr>
+          <a:lstStyle/>
+          <a:p>
+            <a:pPr lvl="1"/>
+            <a:endParaRPr lang="hr-HR" sz="3200" dirty="0" smtClean="0">
+              <a:latin typeface="Arial" panose="020B0604020202020204" pitchFamily="34" charset="0"/>
+              <a:cs typeface="Arial" panose="020B0604020202020204" pitchFamily="34" charset="0"/>
+            </a:endParaRPr>
+          </a:p>
+          <a:p>
+            <a:pPr lvl="1"/>
+            <a:r>
+              <a:rPr lang="hr-HR" sz="3200" dirty="0" smtClean="0">
+                <a:latin typeface="Arial" panose="020B0604020202020204" pitchFamily="34" charset="0"/>
+                <a:cs typeface="Arial" panose="020B0604020202020204" pitchFamily="34" charset="0"/>
+              </a:rPr>
+              <a:t>myRIO kao ideja...</a:t>
+            </a:r>
+          </a:p>
+          <a:p>
+            <a:pPr lvl="1"/>
+            <a:endParaRPr lang="hr-HR" sz="3200" dirty="0">
+              <a:latin typeface="Arial" panose="020B0604020202020204" pitchFamily="34" charset="0"/>
+              <a:cs typeface="Arial" panose="020B0604020202020204" pitchFamily="34" charset="0"/>
+            </a:endParaRPr>
+          </a:p>
+          <a:p>
+            <a:pPr lvl="1"/>
+            <a:r>
+              <a:rPr lang="hr-HR" sz="3200" dirty="0" smtClean="0">
+                <a:latin typeface="Arial" panose="020B0604020202020204" pitchFamily="34" charset="0"/>
+                <a:cs typeface="Arial" panose="020B0604020202020204" pitchFamily="34" charset="0"/>
+              </a:rPr>
+              <a:t>Samostalan rad</a:t>
+            </a:r>
+          </a:p>
+          <a:p>
+            <a:pPr lvl="1"/>
+            <a:endParaRPr lang="hr-HR" sz="3200" dirty="0">
+              <a:latin typeface="Arial" panose="020B0604020202020204" pitchFamily="34" charset="0"/>
+              <a:cs typeface="Arial" panose="020B0604020202020204" pitchFamily="34" charset="0"/>
+            </a:endParaRPr>
+          </a:p>
+          <a:p>
+            <a:pPr lvl="1"/>
+            <a:endParaRPr lang="hr-HR" sz="3200" dirty="0">
+              <a:latin typeface="Arial" panose="020B0604020202020204" pitchFamily="34" charset="0"/>
+              <a:cs typeface="Arial" panose="020B0604020202020204" pitchFamily="34" charset="0"/>
+            </a:endParaRPr>
+          </a:p>
+        </p:txBody>
+      </p:sp>
+    </p:spTree>
+    <p:extLst>
+      <p:ext uri="{BB962C8B-B14F-4D97-AF65-F5344CB8AC3E}">
+        <p14:creationId xmlns:p14="http://schemas.microsoft.com/office/powerpoint/2010/main" val="2254794768"/>
+      </p:ext>
+    </p:extLst>
+  </p:cSld>
+  <p:clrMapOvr>
+    <a:masterClrMapping/>
+  </p:clrMapOvr>
 </p:sld>
 </file>
 
@@ -4921,77 +6854,75 @@
         </p:nvSpPr>
         <p:spPr/>
         <p:txBody>
-          <a:bodyPr/>
+          <a:bodyPr>
+            <a:normAutofit/>
+          </a:bodyPr>
           <a:lstStyle/>
           <a:p>
             <a:pPr lvl="1"/>
             <a:r>
-              <a:rPr lang="hr-HR" dirty="0">
+              <a:rPr lang="hr-HR" sz="3200" dirty="0" smtClean="0">
                 <a:latin typeface="Arial" panose="020B0604020202020204" pitchFamily="34" charset="0"/>
                 <a:cs typeface="Arial" panose="020B0604020202020204" pitchFamily="34" charset="0"/>
               </a:rPr>
-              <a:t>Istosmjerni motor</a:t>
-            </a:r>
-          </a:p>
-          <a:p>
-            <a:pPr lvl="2"/>
-            <a:r>
-              <a:rPr lang="hr-HR" dirty="0">
+              <a:t>Napomena: istosmjerni motor</a:t>
+            </a:r>
+          </a:p>
+          <a:p>
+            <a:pPr lvl="1"/>
+            <a:endParaRPr lang="hr-HR" sz="3200" dirty="0" smtClean="0">
+              <a:latin typeface="Arial" panose="020B0604020202020204" pitchFamily="34" charset="0"/>
+              <a:cs typeface="Arial" panose="020B0604020202020204" pitchFamily="34" charset="0"/>
+            </a:endParaRPr>
+          </a:p>
+          <a:p>
+            <a:pPr lvl="1"/>
+            <a:r>
+              <a:rPr lang="hr-HR" sz="3200" dirty="0" smtClean="0">
                 <a:latin typeface="Arial" panose="020B0604020202020204" pitchFamily="34" charset="0"/>
                 <a:cs typeface="Arial" panose="020B0604020202020204" pitchFamily="34" charset="0"/>
               </a:rPr>
-              <a:t>Široka upotreba</a:t>
-            </a:r>
-          </a:p>
-          <a:p>
-            <a:pPr lvl="2"/>
-            <a:r>
-              <a:rPr lang="hr-HR" dirty="0">
+              <a:t>Cilj – upravljanje motorom</a:t>
+            </a:r>
+            <a:r>
+              <a:rPr lang="hr-HR" sz="2800" dirty="0">
                 <a:latin typeface="Arial" panose="020B0604020202020204" pitchFamily="34" charset="0"/>
                 <a:cs typeface="Arial" panose="020B0604020202020204" pitchFamily="34" charset="0"/>
               </a:rPr>
-              <a:t>Laka upotrebjlivost</a:t>
-            </a:r>
-          </a:p>
-          <a:p>
-            <a:pPr lvl="1"/>
-            <a:r>
-              <a:rPr lang="hr-HR" dirty="0">
+              <a:t> </a:t>
+            </a:r>
+            <a:r>
+              <a:rPr lang="hr-HR" sz="3400" dirty="0" smtClean="0">
                 <a:latin typeface="Arial" panose="020B0604020202020204" pitchFamily="34" charset="0"/>
                 <a:cs typeface="Arial" panose="020B0604020202020204" pitchFamily="34" charset="0"/>
               </a:rPr>
-              <a:t>LabVIEW</a:t>
-            </a:r>
-          </a:p>
-          <a:p>
-            <a:pPr lvl="2"/>
-            <a:r>
-              <a:rPr lang="hr-HR" dirty="0">
-                <a:latin typeface="Arial" panose="020B0604020202020204" pitchFamily="34" charset="0"/>
-                <a:cs typeface="Arial" panose="020B0604020202020204" pitchFamily="34" charset="0"/>
-              </a:rPr>
-              <a:t>Grafičko programsko sučelje</a:t>
-            </a:r>
-          </a:p>
-          <a:p>
-            <a:pPr lvl="2"/>
-            <a:r>
-              <a:rPr lang="hr-HR" dirty="0">
-                <a:latin typeface="Arial" panose="020B0604020202020204" pitchFamily="34" charset="0"/>
-                <a:cs typeface="Arial" panose="020B0604020202020204" pitchFamily="34" charset="0"/>
-              </a:rPr>
-              <a:t>Velik broj ugrađenih funkcija</a:t>
-            </a:r>
-          </a:p>
-          <a:p>
-            <a:pPr lvl="2"/>
-            <a:endParaRPr lang="hr-HR" dirty="0">
+              <a:t>uz sprječavanje klizanja</a:t>
+            </a:r>
+          </a:p>
+          <a:p>
+            <a:pPr lvl="1"/>
+            <a:endParaRPr lang="hr-HR" sz="3400" dirty="0" smtClean="0">
               <a:latin typeface="Arial" panose="020B0604020202020204" pitchFamily="34" charset="0"/>
               <a:cs typeface="Arial" panose="020B0604020202020204" pitchFamily="34" charset="0"/>
             </a:endParaRPr>
           </a:p>
           <a:p>
-            <a:endParaRPr lang="hr-HR" dirty="0">
+            <a:pPr lvl="1"/>
+            <a:endParaRPr lang="hr-HR" sz="3400" dirty="0">
+              <a:latin typeface="Arial" panose="020B0604020202020204" pitchFamily="34" charset="0"/>
+              <a:cs typeface="Arial" panose="020B0604020202020204" pitchFamily="34" charset="0"/>
+            </a:endParaRPr>
+          </a:p>
+          <a:p>
+            <a:pPr lvl="1"/>
+            <a:endParaRPr lang="hr-HR" sz="3400" dirty="0" smtClean="0">
+              <a:latin typeface="Arial" panose="020B0604020202020204" pitchFamily="34" charset="0"/>
+              <a:cs typeface="Arial" panose="020B0604020202020204" pitchFamily="34" charset="0"/>
+            </a:endParaRPr>
+          </a:p>
+          <a:p>
+            <a:pPr lvl="2"/>
+            <a:endParaRPr lang="hr-HR" sz="2800" dirty="0" smtClean="0">
               <a:latin typeface="Arial" panose="020B0604020202020204" pitchFamily="34" charset="0"/>
               <a:cs typeface="Arial" panose="020B0604020202020204" pitchFamily="34" charset="0"/>
             </a:endParaRPr>
@@ -5120,8 +7051,8 @@
           <a:chExt cx="0" cy="0"/>
         </a:xfrm>
       </p:grpSpPr>
-      <mc:AlternateContent xmlns:mc="http://schemas.openxmlformats.org/markup-compatibility/2006">
-        <mc:Choice xmlns:a14="http://schemas.microsoft.com/office/drawing/2010/main" Requires="a14">
+      <mc:AlternateContent xmlns:mc="http://schemas.openxmlformats.org/markup-compatibility/2006" xmlns:a14="http://schemas.microsoft.com/office/drawing/2010/main">
+        <mc:Choice Requires="a14">
           <p:sp>
             <p:nvSpPr>
               <p:cNvPr id="3" name="Content Placeholder 2"/>
@@ -5264,7 +7195,7 @@
             </p:txBody>
           </p:sp>
         </mc:Choice>
-        <mc:Fallback>
+        <mc:Fallback xmlns="">
           <p:sp>
             <p:nvSpPr>
               <p:cNvPr id="3" name="Content Placeholder 2"/>
@@ -5313,7 +7244,7 @@
           <a:bodyPr/>
           <a:lstStyle/>
           <a:p>
-            <a:endParaRPr lang="hr-HR"/>
+            <a:endParaRPr lang="hr-HR" dirty="0"/>
           </a:p>
         </p:txBody>
       </p:sp>
@@ -5397,8 +7328,8 @@
         </p:blipFill>
         <p:spPr>
           <a:xfrm>
-            <a:off x="6853110" y="1100629"/>
-            <a:ext cx="3947043" cy="4022725"/>
+            <a:off x="6291743" y="166155"/>
+            <a:ext cx="4863937" cy="4957200"/>
           </a:xfrm>
         </p:spPr>
       </p:pic>
@@ -5424,8 +7355,8 @@
         </p:blipFill>
         <p:spPr>
           <a:xfrm>
-            <a:off x="941054" y="953335"/>
-            <a:ext cx="4797016" cy="4317314"/>
+            <a:off x="1097279" y="620847"/>
+            <a:ext cx="5194464" cy="4649802"/>
           </a:xfrm>
           <a:prstGeom prst="rect">
             <a:avLst/>
@@ -5774,6 +7705,13 @@
   <p:clrMapOvr>
     <a:masterClrMapping/>
   </p:clrMapOvr>
+  <p:timing>
+    <p:tnLst>
+      <p:par>
+        <p:cTn id="1" dur="indefinite" restart="never" nodeType="tmRoot"/>
+      </p:par>
+    </p:tnLst>
+  </p:timing>
 </p:sld>
 </file>
 

</xml_diff>

<commit_message>
! final touch ppt
</commit_message>
<xml_diff>
--- a/Upravljanje koračnim motorom korištenjem myRio upravljačke platforme.pptx
+++ b/Upravljanje koračnim motorom korištenjem myRio upravljačke platforme.pptx
@@ -3962,6 +3962,70 @@
               <a:pPr/>
               <a:t>28. veljače 2020.</a:t>
             </a:fld>
+            <a:endParaRPr lang="hr-HR" sz="1600" dirty="0">
+              <a:latin typeface="Arial" panose="020B0604020202020204" pitchFamily="34" charset="0"/>
+              <a:cs typeface="Arial" panose="020B0604020202020204" pitchFamily="34" charset="0"/>
+            </a:endParaRPr>
+          </a:p>
+        </p:txBody>
+      </p:sp>
+      <p:sp>
+        <p:nvSpPr>
+          <p:cNvPr id="3" name="TextBox 2"/>
+          <p:cNvSpPr txBox="1"/>
+          <p:nvPr/>
+        </p:nvSpPr>
+        <p:spPr>
+          <a:xfrm>
+            <a:off x="4172228" y="142451"/>
+            <a:ext cx="3471109" cy="338554"/>
+          </a:xfrm>
+          <a:prstGeom prst="rect">
+            <a:avLst/>
+          </a:prstGeom>
+          <a:noFill/>
+        </p:spPr>
+        <p:txBody>
+          <a:bodyPr wrap="square" rtlCol="0">
+            <a:spAutoFit/>
+          </a:bodyPr>
+          <a:lstStyle/>
+          <a:p>
+            <a:r>
+              <a:rPr lang="en-US" sz="1600" dirty="0" err="1" smtClean="0">
+                <a:latin typeface="Arial" panose="020B0604020202020204" pitchFamily="34" charset="0"/>
+                <a:cs typeface="Arial" panose="020B0604020202020204" pitchFamily="34" charset="0"/>
+              </a:rPr>
+              <a:t>Fakultet</a:t>
+            </a:r>
+            <a:r>
+              <a:rPr lang="en-US" sz="1600" dirty="0" smtClean="0">
+                <a:latin typeface="Arial" panose="020B0604020202020204" pitchFamily="34" charset="0"/>
+                <a:cs typeface="Arial" panose="020B0604020202020204" pitchFamily="34" charset="0"/>
+              </a:rPr>
+              <a:t> </a:t>
+            </a:r>
+            <a:r>
+              <a:rPr lang="en-US" sz="1600" dirty="0" err="1" smtClean="0">
+                <a:latin typeface="Arial" panose="020B0604020202020204" pitchFamily="34" charset="0"/>
+                <a:cs typeface="Arial" panose="020B0604020202020204" pitchFamily="34" charset="0"/>
+              </a:rPr>
+              <a:t>elektrotehnike</a:t>
+            </a:r>
+            <a:r>
+              <a:rPr lang="en-US" sz="1600" dirty="0" smtClean="0">
+                <a:latin typeface="Arial" panose="020B0604020202020204" pitchFamily="34" charset="0"/>
+                <a:cs typeface="Arial" panose="020B0604020202020204" pitchFamily="34" charset="0"/>
+              </a:rPr>
+              <a:t> </a:t>
+            </a:r>
+            <a:r>
+              <a:rPr lang="hr-HR" sz="1600" dirty="0" smtClean="0">
+                <a:latin typeface="Arial" panose="020B0604020202020204" pitchFamily="34" charset="0"/>
+                <a:cs typeface="Arial" panose="020B0604020202020204" pitchFamily="34" charset="0"/>
+              </a:rPr>
+              <a:t>i računarstva</a:t>
+            </a:r>
             <a:endParaRPr lang="hr-HR" sz="1600" dirty="0">
               <a:latin typeface="Arial" panose="020B0604020202020204" pitchFamily="34" charset="0"/>
               <a:cs typeface="Arial" panose="020B0604020202020204" pitchFamily="34" charset="0"/>
@@ -6129,11 +6193,7 @@
             </a:pPr>
             <a:r>
               <a:rPr lang="hr-HR" sz="2400" dirty="0" smtClean="0"/>
-              <a:t>Rješenje upravljanja </a:t>
-            </a:r>
-            <a:r>
-              <a:rPr lang="hr-HR" sz="2400" dirty="0" smtClean="0"/>
-              <a:t>motorom</a:t>
+              <a:t>Rješenje upravljanja motorom</a:t>
             </a:r>
           </a:p>
           <a:p>
@@ -7051,8 +7111,8 @@
           <a:chExt cx="0" cy="0"/>
         </a:xfrm>
       </p:grpSpPr>
-      <mc:AlternateContent xmlns:mc="http://schemas.openxmlformats.org/markup-compatibility/2006" xmlns:a14="http://schemas.microsoft.com/office/drawing/2010/main">
-        <mc:Choice Requires="a14">
+      <mc:AlternateContent xmlns:mc="http://schemas.openxmlformats.org/markup-compatibility/2006">
+        <mc:Choice xmlns:a14="http://schemas.microsoft.com/office/drawing/2010/main" Requires="a14">
           <p:sp>
             <p:nvSpPr>
               <p:cNvPr id="3" name="Content Placeholder 2"/>
@@ -7181,11 +7241,11 @@
               <a:p>
                 <a:pPr lvl="2"/>
                 <a:r>
-                  <a:rPr lang="hr-HR" sz="2400" dirty="0" smtClean="0">
+                  <a:rPr lang="hr-HR" sz="2400" smtClean="0">
                     <a:latin typeface="Arial" panose="020B0604020202020204" pitchFamily="34" charset="0"/>
                     <a:cs typeface="Arial" panose="020B0604020202020204" pitchFamily="34" charset="0"/>
                   </a:rPr>
-                  <a:t>TTL logika</a:t>
+                  <a:t>TTL</a:t>
                 </a:r>
                 <a:endParaRPr lang="hr-HR" sz="2400" dirty="0">
                   <a:latin typeface="Arial" panose="020B0604020202020204" pitchFamily="34" charset="0"/>
@@ -7195,7 +7255,7 @@
             </p:txBody>
           </p:sp>
         </mc:Choice>
-        <mc:Fallback xmlns="">
+        <mc:Fallback>
           <p:sp>
             <p:nvSpPr>
               <p:cNvPr id="3" name="Content Placeholder 2"/>

</xml_diff>